<commit_message>
dummy update to PPT
</commit_message>
<xml_diff>
--- a/ci-cd-stages-demo/docs/cicd.pptx
+++ b/ci-cd-stages-demo/docs/cicd.pptx
@@ -8,6 +8,7 @@
     <p:sldId id="256" r:id="rId2"/>
     <p:sldId id="257" r:id="rId3"/>
     <p:sldId id="258" r:id="rId4"/>
+    <p:sldId id="259" r:id="rId5"/>
   </p:sldIdLst>
   <p:sldSz cx="12192000" cy="6858000"/>
   <p:notesSz cx="6858000" cy="9144000"/>
@@ -263,7 +264,7 @@
           <a:p>
             <a:fld id="{07BEF4AF-FE93-48EE-A03F-18E680F520CD}" type="datetimeFigureOut">
               <a:rPr lang="en-GB" smtClean="0"/>
-              <a:t>25/07/2023</a:t>
+              <a:t>28/07/2023</a:t>
             </a:fld>
             <a:endParaRPr lang="en-GB"/>
           </a:p>
@@ -463,7 +464,7 @@
           <a:p>
             <a:fld id="{07BEF4AF-FE93-48EE-A03F-18E680F520CD}" type="datetimeFigureOut">
               <a:rPr lang="en-GB" smtClean="0"/>
-              <a:t>25/07/2023</a:t>
+              <a:t>28/07/2023</a:t>
             </a:fld>
             <a:endParaRPr lang="en-GB"/>
           </a:p>
@@ -673,7 +674,7 @@
           <a:p>
             <a:fld id="{07BEF4AF-FE93-48EE-A03F-18E680F520CD}" type="datetimeFigureOut">
               <a:rPr lang="en-GB" smtClean="0"/>
-              <a:t>25/07/2023</a:t>
+              <a:t>28/07/2023</a:t>
             </a:fld>
             <a:endParaRPr lang="en-GB"/>
           </a:p>
@@ -873,7 +874,7 @@
           <a:p>
             <a:fld id="{07BEF4AF-FE93-48EE-A03F-18E680F520CD}" type="datetimeFigureOut">
               <a:rPr lang="en-GB" smtClean="0"/>
-              <a:t>25/07/2023</a:t>
+              <a:t>28/07/2023</a:t>
             </a:fld>
             <a:endParaRPr lang="en-GB"/>
           </a:p>
@@ -1149,7 +1150,7 @@
           <a:p>
             <a:fld id="{07BEF4AF-FE93-48EE-A03F-18E680F520CD}" type="datetimeFigureOut">
               <a:rPr lang="en-GB" smtClean="0"/>
-              <a:t>25/07/2023</a:t>
+              <a:t>28/07/2023</a:t>
             </a:fld>
             <a:endParaRPr lang="en-GB"/>
           </a:p>
@@ -1417,7 +1418,7 @@
           <a:p>
             <a:fld id="{07BEF4AF-FE93-48EE-A03F-18E680F520CD}" type="datetimeFigureOut">
               <a:rPr lang="en-GB" smtClean="0"/>
-              <a:t>25/07/2023</a:t>
+              <a:t>28/07/2023</a:t>
             </a:fld>
             <a:endParaRPr lang="en-GB"/>
           </a:p>
@@ -1832,7 +1833,7 @@
           <a:p>
             <a:fld id="{07BEF4AF-FE93-48EE-A03F-18E680F520CD}" type="datetimeFigureOut">
               <a:rPr lang="en-GB" smtClean="0"/>
-              <a:t>25/07/2023</a:t>
+              <a:t>28/07/2023</a:t>
             </a:fld>
             <a:endParaRPr lang="en-GB"/>
           </a:p>
@@ -1974,7 +1975,7 @@
           <a:p>
             <a:fld id="{07BEF4AF-FE93-48EE-A03F-18E680F520CD}" type="datetimeFigureOut">
               <a:rPr lang="en-GB" smtClean="0"/>
-              <a:t>25/07/2023</a:t>
+              <a:t>28/07/2023</a:t>
             </a:fld>
             <a:endParaRPr lang="en-GB"/>
           </a:p>
@@ -2087,7 +2088,7 @@
           <a:p>
             <a:fld id="{07BEF4AF-FE93-48EE-A03F-18E680F520CD}" type="datetimeFigureOut">
               <a:rPr lang="en-GB" smtClean="0"/>
-              <a:t>25/07/2023</a:t>
+              <a:t>28/07/2023</a:t>
             </a:fld>
             <a:endParaRPr lang="en-GB"/>
           </a:p>
@@ -2400,7 +2401,7 @@
           <a:p>
             <a:fld id="{07BEF4AF-FE93-48EE-A03F-18E680F520CD}" type="datetimeFigureOut">
               <a:rPr lang="en-GB" smtClean="0"/>
-              <a:t>25/07/2023</a:t>
+              <a:t>28/07/2023</a:t>
             </a:fld>
             <a:endParaRPr lang="en-GB"/>
           </a:p>
@@ -2689,7 +2690,7 @@
           <a:p>
             <a:fld id="{07BEF4AF-FE93-48EE-A03F-18E680F520CD}" type="datetimeFigureOut">
               <a:rPr lang="en-GB" smtClean="0"/>
-              <a:t>25/07/2023</a:t>
+              <a:t>28/07/2023</a:t>
             </a:fld>
             <a:endParaRPr lang="en-GB"/>
           </a:p>
@@ -2932,7 +2933,7 @@
           <a:p>
             <a:fld id="{07BEF4AF-FE93-48EE-A03F-18E680F520CD}" type="datetimeFigureOut">
               <a:rPr lang="en-GB" smtClean="0"/>
-              <a:t>25/07/2023</a:t>
+              <a:t>28/07/2023</a:t>
             </a:fld>
             <a:endParaRPr lang="en-GB"/>
           </a:p>
@@ -3916,6 +3917,36 @@
 </p:sld>
 </file>
 
+<file path=ppt/slides/slide4.xml><?xml version="1.0" encoding="utf-8"?>
+<p:sld xmlns:a="http://schemas.openxmlformats.org/drawingml/2006/main" xmlns:r="http://schemas.openxmlformats.org/officeDocument/2006/relationships" xmlns:p="http://schemas.openxmlformats.org/presentationml/2006/main">
+  <p:cSld>
+    <p:spTree>
+      <p:nvGrpSpPr>
+        <p:cNvPr id="1" name=""/>
+        <p:cNvGrpSpPr/>
+        <p:nvPr/>
+      </p:nvGrpSpPr>
+      <p:grpSpPr>
+        <a:xfrm>
+          <a:off x="0" y="0"/>
+          <a:ext cx="0" cy="0"/>
+          <a:chOff x="0" y="0"/>
+          <a:chExt cx="0" cy="0"/>
+        </a:xfrm>
+      </p:grpSpPr>
+    </p:spTree>
+    <p:extLst>
+      <p:ext uri="{BB962C8B-B14F-4D97-AF65-F5344CB8AC3E}">
+        <p14:creationId xmlns:p14="http://schemas.microsoft.com/office/powerpoint/2010/main" val="472387368"/>
+      </p:ext>
+    </p:extLst>
+  </p:cSld>
+  <p:clrMapOvr>
+    <a:masterClrMapping/>
+  </p:clrMapOvr>
+</p:sld>
+</file>
+
 <file path=ppt/theme/theme1.xml><?xml version="1.0" encoding="utf-8"?>
 <a:theme xmlns:a="http://schemas.openxmlformats.org/drawingml/2006/main" name="Office Theme">
   <a:themeElements>

</xml_diff>

<commit_message>
dummy change to PPT
</commit_message>
<xml_diff>
--- a/ci-cd-stages-demo/docs/cicd.pptx
+++ b/ci-cd-stages-demo/docs/cicd.pptx
@@ -8,7 +8,6 @@
     <p:sldId id="256" r:id="rId2"/>
     <p:sldId id="257" r:id="rId3"/>
     <p:sldId id="258" r:id="rId4"/>
-    <p:sldId id="259" r:id="rId5"/>
   </p:sldIdLst>
   <p:sldSz cx="12192000" cy="6858000"/>
   <p:notesSz cx="6858000" cy="9144000"/>
@@ -3917,36 +3916,6 @@
 </p:sld>
 </file>
 
-<file path=ppt/slides/slide4.xml><?xml version="1.0" encoding="utf-8"?>
-<p:sld xmlns:a="http://schemas.openxmlformats.org/drawingml/2006/main" xmlns:r="http://schemas.openxmlformats.org/officeDocument/2006/relationships" xmlns:p="http://schemas.openxmlformats.org/presentationml/2006/main">
-  <p:cSld>
-    <p:spTree>
-      <p:nvGrpSpPr>
-        <p:cNvPr id="1" name=""/>
-        <p:cNvGrpSpPr/>
-        <p:nvPr/>
-      </p:nvGrpSpPr>
-      <p:grpSpPr>
-        <a:xfrm>
-          <a:off x="0" y="0"/>
-          <a:ext cx="0" cy="0"/>
-          <a:chOff x="0" y="0"/>
-          <a:chExt cx="0" cy="0"/>
-        </a:xfrm>
-      </p:grpSpPr>
-    </p:spTree>
-    <p:extLst>
-      <p:ext uri="{BB962C8B-B14F-4D97-AF65-F5344CB8AC3E}">
-        <p14:creationId xmlns:p14="http://schemas.microsoft.com/office/powerpoint/2010/main" val="472387368"/>
-      </p:ext>
-    </p:extLst>
-  </p:cSld>
-  <p:clrMapOvr>
-    <a:masterClrMapping/>
-  </p:clrMapOvr>
-</p:sld>
-</file>
-
 <file path=ppt/theme/theme1.xml><?xml version="1.0" encoding="utf-8"?>
 <a:theme xmlns:a="http://schemas.openxmlformats.org/drawingml/2006/main" name="Office Theme">
   <a:themeElements>

</xml_diff>

<commit_message>
Step 300 onwards (#30)
* dummy comments in 200

* pr path trigger

* Step 300 - initial cicd.yml

* Build name

* Step 300

* exclude path

* dummy update to PPT

* leading slash in exclude path

* dummy change to PPT

* Removed single quotes from path

* Dummy update to PPT

* Step 300 - updated text

* link to semver
</commit_message>
<xml_diff>
--- a/ci-cd-stages-demo/docs/cicd.pptx
+++ b/ci-cd-stages-demo/docs/cicd.pptx
@@ -263,7 +263,7 @@
           <a:p>
             <a:fld id="{07BEF4AF-FE93-48EE-A03F-18E680F520CD}" type="datetimeFigureOut">
               <a:rPr lang="en-GB" smtClean="0"/>
-              <a:t>25/07/2023</a:t>
+              <a:t>28/07/2023</a:t>
             </a:fld>
             <a:endParaRPr lang="en-GB"/>
           </a:p>
@@ -463,7 +463,7 @@
           <a:p>
             <a:fld id="{07BEF4AF-FE93-48EE-A03F-18E680F520CD}" type="datetimeFigureOut">
               <a:rPr lang="en-GB" smtClean="0"/>
-              <a:t>25/07/2023</a:t>
+              <a:t>28/07/2023</a:t>
             </a:fld>
             <a:endParaRPr lang="en-GB"/>
           </a:p>
@@ -673,7 +673,7 @@
           <a:p>
             <a:fld id="{07BEF4AF-FE93-48EE-A03F-18E680F520CD}" type="datetimeFigureOut">
               <a:rPr lang="en-GB" smtClean="0"/>
-              <a:t>25/07/2023</a:t>
+              <a:t>28/07/2023</a:t>
             </a:fld>
             <a:endParaRPr lang="en-GB"/>
           </a:p>
@@ -873,7 +873,7 @@
           <a:p>
             <a:fld id="{07BEF4AF-FE93-48EE-A03F-18E680F520CD}" type="datetimeFigureOut">
               <a:rPr lang="en-GB" smtClean="0"/>
-              <a:t>25/07/2023</a:t>
+              <a:t>28/07/2023</a:t>
             </a:fld>
             <a:endParaRPr lang="en-GB"/>
           </a:p>
@@ -1149,7 +1149,7 @@
           <a:p>
             <a:fld id="{07BEF4AF-FE93-48EE-A03F-18E680F520CD}" type="datetimeFigureOut">
               <a:rPr lang="en-GB" smtClean="0"/>
-              <a:t>25/07/2023</a:t>
+              <a:t>28/07/2023</a:t>
             </a:fld>
             <a:endParaRPr lang="en-GB"/>
           </a:p>
@@ -1417,7 +1417,7 @@
           <a:p>
             <a:fld id="{07BEF4AF-FE93-48EE-A03F-18E680F520CD}" type="datetimeFigureOut">
               <a:rPr lang="en-GB" smtClean="0"/>
-              <a:t>25/07/2023</a:t>
+              <a:t>28/07/2023</a:t>
             </a:fld>
             <a:endParaRPr lang="en-GB"/>
           </a:p>
@@ -1832,7 +1832,7 @@
           <a:p>
             <a:fld id="{07BEF4AF-FE93-48EE-A03F-18E680F520CD}" type="datetimeFigureOut">
               <a:rPr lang="en-GB" smtClean="0"/>
-              <a:t>25/07/2023</a:t>
+              <a:t>28/07/2023</a:t>
             </a:fld>
             <a:endParaRPr lang="en-GB"/>
           </a:p>
@@ -1974,7 +1974,7 @@
           <a:p>
             <a:fld id="{07BEF4AF-FE93-48EE-A03F-18E680F520CD}" type="datetimeFigureOut">
               <a:rPr lang="en-GB" smtClean="0"/>
-              <a:t>25/07/2023</a:t>
+              <a:t>28/07/2023</a:t>
             </a:fld>
             <a:endParaRPr lang="en-GB"/>
           </a:p>
@@ -2087,7 +2087,7 @@
           <a:p>
             <a:fld id="{07BEF4AF-FE93-48EE-A03F-18E680F520CD}" type="datetimeFigureOut">
               <a:rPr lang="en-GB" smtClean="0"/>
-              <a:t>25/07/2023</a:t>
+              <a:t>28/07/2023</a:t>
             </a:fld>
             <a:endParaRPr lang="en-GB"/>
           </a:p>
@@ -2400,7 +2400,7 @@
           <a:p>
             <a:fld id="{07BEF4AF-FE93-48EE-A03F-18E680F520CD}" type="datetimeFigureOut">
               <a:rPr lang="en-GB" smtClean="0"/>
-              <a:t>25/07/2023</a:t>
+              <a:t>28/07/2023</a:t>
             </a:fld>
             <a:endParaRPr lang="en-GB"/>
           </a:p>
@@ -2689,7 +2689,7 @@
           <a:p>
             <a:fld id="{07BEF4AF-FE93-48EE-A03F-18E680F520CD}" type="datetimeFigureOut">
               <a:rPr lang="en-GB" smtClean="0"/>
-              <a:t>25/07/2023</a:t>
+              <a:t>28/07/2023</a:t>
             </a:fld>
             <a:endParaRPr lang="en-GB"/>
           </a:p>
@@ -2932,7 +2932,7 @@
           <a:p>
             <a:fld id="{07BEF4AF-FE93-48EE-A03F-18E680F520CD}" type="datetimeFigureOut">
               <a:rPr lang="en-GB" smtClean="0"/>
-              <a:t>25/07/2023</a:t>
+              <a:t>28/07/2023</a:t>
             </a:fld>
             <a:endParaRPr lang="en-GB"/>
           </a:p>

</xml_diff>

<commit_message>
Nearly completed Python docs
</commit_message>
<xml_diff>
--- a/ci-cd-stages-demo/docs/cicd.pptx
+++ b/ci-cd-stages-demo/docs/cicd.pptx
@@ -9,6 +9,7 @@
     <p:sldId id="257" r:id="rId3"/>
     <p:sldId id="258" r:id="rId4"/>
     <p:sldId id="259" r:id="rId5"/>
+    <p:sldId id="260" r:id="rId6"/>
   </p:sldIdLst>
   <p:sldSz cx="12192000" cy="6858000"/>
   <p:notesSz cx="6858000" cy="9144000"/>
@@ -264,7 +265,7 @@
           <a:p>
             <a:fld id="{07BEF4AF-FE93-48EE-A03F-18E680F520CD}" type="datetimeFigureOut">
               <a:rPr lang="en-GB" smtClean="0"/>
-              <a:t>11/08/2023</a:t>
+              <a:t>20/08/2023</a:t>
             </a:fld>
             <a:endParaRPr lang="en-GB"/>
           </a:p>
@@ -464,7 +465,7 @@
           <a:p>
             <a:fld id="{07BEF4AF-FE93-48EE-A03F-18E680F520CD}" type="datetimeFigureOut">
               <a:rPr lang="en-GB" smtClean="0"/>
-              <a:t>11/08/2023</a:t>
+              <a:t>20/08/2023</a:t>
             </a:fld>
             <a:endParaRPr lang="en-GB"/>
           </a:p>
@@ -674,7 +675,7 @@
           <a:p>
             <a:fld id="{07BEF4AF-FE93-48EE-A03F-18E680F520CD}" type="datetimeFigureOut">
               <a:rPr lang="en-GB" smtClean="0"/>
-              <a:t>11/08/2023</a:t>
+              <a:t>20/08/2023</a:t>
             </a:fld>
             <a:endParaRPr lang="en-GB"/>
           </a:p>
@@ -874,7 +875,7 @@
           <a:p>
             <a:fld id="{07BEF4AF-FE93-48EE-A03F-18E680F520CD}" type="datetimeFigureOut">
               <a:rPr lang="en-GB" smtClean="0"/>
-              <a:t>11/08/2023</a:t>
+              <a:t>20/08/2023</a:t>
             </a:fld>
             <a:endParaRPr lang="en-GB"/>
           </a:p>
@@ -1150,7 +1151,7 @@
           <a:p>
             <a:fld id="{07BEF4AF-FE93-48EE-A03F-18E680F520CD}" type="datetimeFigureOut">
               <a:rPr lang="en-GB" smtClean="0"/>
-              <a:t>11/08/2023</a:t>
+              <a:t>20/08/2023</a:t>
             </a:fld>
             <a:endParaRPr lang="en-GB"/>
           </a:p>
@@ -1418,7 +1419,7 @@
           <a:p>
             <a:fld id="{07BEF4AF-FE93-48EE-A03F-18E680F520CD}" type="datetimeFigureOut">
               <a:rPr lang="en-GB" smtClean="0"/>
-              <a:t>11/08/2023</a:t>
+              <a:t>20/08/2023</a:t>
             </a:fld>
             <a:endParaRPr lang="en-GB"/>
           </a:p>
@@ -1833,7 +1834,7 @@
           <a:p>
             <a:fld id="{07BEF4AF-FE93-48EE-A03F-18E680F520CD}" type="datetimeFigureOut">
               <a:rPr lang="en-GB" smtClean="0"/>
-              <a:t>11/08/2023</a:t>
+              <a:t>20/08/2023</a:t>
             </a:fld>
             <a:endParaRPr lang="en-GB"/>
           </a:p>
@@ -1975,7 +1976,7 @@
           <a:p>
             <a:fld id="{07BEF4AF-FE93-48EE-A03F-18E680F520CD}" type="datetimeFigureOut">
               <a:rPr lang="en-GB" smtClean="0"/>
-              <a:t>11/08/2023</a:t>
+              <a:t>20/08/2023</a:t>
             </a:fld>
             <a:endParaRPr lang="en-GB"/>
           </a:p>
@@ -2088,7 +2089,7 @@
           <a:p>
             <a:fld id="{07BEF4AF-FE93-48EE-A03F-18E680F520CD}" type="datetimeFigureOut">
               <a:rPr lang="en-GB" smtClean="0"/>
-              <a:t>11/08/2023</a:t>
+              <a:t>20/08/2023</a:t>
             </a:fld>
             <a:endParaRPr lang="en-GB"/>
           </a:p>
@@ -2401,7 +2402,7 @@
           <a:p>
             <a:fld id="{07BEF4AF-FE93-48EE-A03F-18E680F520CD}" type="datetimeFigureOut">
               <a:rPr lang="en-GB" smtClean="0"/>
-              <a:t>11/08/2023</a:t>
+              <a:t>20/08/2023</a:t>
             </a:fld>
             <a:endParaRPr lang="en-GB"/>
           </a:p>
@@ -2690,7 +2691,7 @@
           <a:p>
             <a:fld id="{07BEF4AF-FE93-48EE-A03F-18E680F520CD}" type="datetimeFigureOut">
               <a:rPr lang="en-GB" smtClean="0"/>
-              <a:t>11/08/2023</a:t>
+              <a:t>20/08/2023</a:t>
             </a:fld>
             <a:endParaRPr lang="en-GB"/>
           </a:p>
@@ -2933,7 +2934,7 @@
           <a:p>
             <a:fld id="{07BEF4AF-FE93-48EE-A03F-18E680F520CD}" type="datetimeFigureOut">
               <a:rPr lang="en-GB" smtClean="0"/>
-              <a:t>11/08/2023</a:t>
+              <a:t>20/08/2023</a:t>
             </a:fld>
             <a:endParaRPr lang="en-GB"/>
           </a:p>
@@ -4166,6 +4167,66 @@
 </p:sld>
 </file>
 
+<file path=ppt/slides/slide5.xml><?xml version="1.0" encoding="utf-8"?>
+<p:sld xmlns:a="http://schemas.openxmlformats.org/drawingml/2006/main" xmlns:r="http://schemas.openxmlformats.org/officeDocument/2006/relationships" xmlns:p="http://schemas.openxmlformats.org/presentationml/2006/main">
+  <p:cSld>
+    <p:spTree>
+      <p:nvGrpSpPr>
+        <p:cNvPr id="1" name=""/>
+        <p:cNvGrpSpPr/>
+        <p:nvPr/>
+      </p:nvGrpSpPr>
+      <p:grpSpPr>
+        <a:xfrm>
+          <a:off x="0" y="0"/>
+          <a:ext cx="0" cy="0"/>
+          <a:chOff x="0" y="0"/>
+          <a:chExt cx="0" cy="0"/>
+        </a:xfrm>
+      </p:grpSpPr>
+      <p:pic>
+        <p:nvPicPr>
+          <p:cNvPr id="5" name="Picture 4">
+            <a:extLst>
+              <a:ext uri="{FF2B5EF4-FFF2-40B4-BE49-F238E27FC236}">
+                <a16:creationId xmlns:a16="http://schemas.microsoft.com/office/drawing/2014/main" id="{9C346CC8-6CAF-5353-5813-174FFE0F253C}"/>
+              </a:ext>
+            </a:extLst>
+          </p:cNvPr>
+          <p:cNvPicPr>
+            <a:picLocks noChangeAspect="1"/>
+          </p:cNvPicPr>
+          <p:nvPr/>
+        </p:nvPicPr>
+        <p:blipFill>
+          <a:blip r:embed="rId2"/>
+          <a:stretch>
+            <a:fillRect/>
+          </a:stretch>
+        </p:blipFill>
+        <p:spPr>
+          <a:xfrm>
+            <a:off x="2381250" y="2728912"/>
+            <a:ext cx="7429500" cy="1400175"/>
+          </a:xfrm>
+          <a:prstGeom prst="rect">
+            <a:avLst/>
+          </a:prstGeom>
+        </p:spPr>
+      </p:pic>
+    </p:spTree>
+    <p:extLst>
+      <p:ext uri="{BB962C8B-B14F-4D97-AF65-F5344CB8AC3E}">
+        <p14:creationId xmlns:p14="http://schemas.microsoft.com/office/powerpoint/2010/main" val="2256406832"/>
+      </p:ext>
+    </p:extLst>
+  </p:cSld>
+  <p:clrMapOvr>
+    <a:masterClrMapping/>
+  </p:clrMapOvr>
+</p:sld>
+</file>
+
 <file path=ppt/theme/theme1.xml><?xml version="1.0" encoding="utf-8"?>
 <a:theme xmlns:a="http://schemas.openxmlformats.org/drawingml/2006/main" name="Office Theme">
   <a:themeElements>

</xml_diff>

<commit_message>
picture of how artifacts work, solution folder view
</commit_message>
<xml_diff>
--- a/ci-cd-stages-demo/docs/cicd.pptx
+++ b/ci-cd-stages-demo/docs/cicd.pptx
@@ -265,7 +265,7 @@
           <a:p>
             <a:fld id="{07BEF4AF-FE93-48EE-A03F-18E680F520CD}" type="datetimeFigureOut">
               <a:rPr lang="en-GB" smtClean="0"/>
-              <a:t>20/08/2023</a:t>
+              <a:t>21/08/2023</a:t>
             </a:fld>
             <a:endParaRPr lang="en-GB"/>
           </a:p>
@@ -465,7 +465,7 @@
           <a:p>
             <a:fld id="{07BEF4AF-FE93-48EE-A03F-18E680F520CD}" type="datetimeFigureOut">
               <a:rPr lang="en-GB" smtClean="0"/>
-              <a:t>20/08/2023</a:t>
+              <a:t>21/08/2023</a:t>
             </a:fld>
             <a:endParaRPr lang="en-GB"/>
           </a:p>
@@ -675,7 +675,7 @@
           <a:p>
             <a:fld id="{07BEF4AF-FE93-48EE-A03F-18E680F520CD}" type="datetimeFigureOut">
               <a:rPr lang="en-GB" smtClean="0"/>
-              <a:t>20/08/2023</a:t>
+              <a:t>21/08/2023</a:t>
             </a:fld>
             <a:endParaRPr lang="en-GB"/>
           </a:p>
@@ -875,7 +875,7 @@
           <a:p>
             <a:fld id="{07BEF4AF-FE93-48EE-A03F-18E680F520CD}" type="datetimeFigureOut">
               <a:rPr lang="en-GB" smtClean="0"/>
-              <a:t>20/08/2023</a:t>
+              <a:t>21/08/2023</a:t>
             </a:fld>
             <a:endParaRPr lang="en-GB"/>
           </a:p>
@@ -1151,7 +1151,7 @@
           <a:p>
             <a:fld id="{07BEF4AF-FE93-48EE-A03F-18E680F520CD}" type="datetimeFigureOut">
               <a:rPr lang="en-GB" smtClean="0"/>
-              <a:t>20/08/2023</a:t>
+              <a:t>21/08/2023</a:t>
             </a:fld>
             <a:endParaRPr lang="en-GB"/>
           </a:p>
@@ -1419,7 +1419,7 @@
           <a:p>
             <a:fld id="{07BEF4AF-FE93-48EE-A03F-18E680F520CD}" type="datetimeFigureOut">
               <a:rPr lang="en-GB" smtClean="0"/>
-              <a:t>20/08/2023</a:t>
+              <a:t>21/08/2023</a:t>
             </a:fld>
             <a:endParaRPr lang="en-GB"/>
           </a:p>
@@ -1834,7 +1834,7 @@
           <a:p>
             <a:fld id="{07BEF4AF-FE93-48EE-A03F-18E680F520CD}" type="datetimeFigureOut">
               <a:rPr lang="en-GB" smtClean="0"/>
-              <a:t>20/08/2023</a:t>
+              <a:t>21/08/2023</a:t>
             </a:fld>
             <a:endParaRPr lang="en-GB"/>
           </a:p>
@@ -1976,7 +1976,7 @@
           <a:p>
             <a:fld id="{07BEF4AF-FE93-48EE-A03F-18E680F520CD}" type="datetimeFigureOut">
               <a:rPr lang="en-GB" smtClean="0"/>
-              <a:t>20/08/2023</a:t>
+              <a:t>21/08/2023</a:t>
             </a:fld>
             <a:endParaRPr lang="en-GB"/>
           </a:p>
@@ -2089,7 +2089,7 @@
           <a:p>
             <a:fld id="{07BEF4AF-FE93-48EE-A03F-18E680F520CD}" type="datetimeFigureOut">
               <a:rPr lang="en-GB" smtClean="0"/>
-              <a:t>20/08/2023</a:t>
+              <a:t>21/08/2023</a:t>
             </a:fld>
             <a:endParaRPr lang="en-GB"/>
           </a:p>
@@ -2402,7 +2402,7 @@
           <a:p>
             <a:fld id="{07BEF4AF-FE93-48EE-A03F-18E680F520CD}" type="datetimeFigureOut">
               <a:rPr lang="en-GB" smtClean="0"/>
-              <a:t>20/08/2023</a:t>
+              <a:t>21/08/2023</a:t>
             </a:fld>
             <a:endParaRPr lang="en-GB"/>
           </a:p>
@@ -2691,7 +2691,7 @@
           <a:p>
             <a:fld id="{07BEF4AF-FE93-48EE-A03F-18E680F520CD}" type="datetimeFigureOut">
               <a:rPr lang="en-GB" smtClean="0"/>
-              <a:t>20/08/2023</a:t>
+              <a:t>21/08/2023</a:t>
             </a:fld>
             <a:endParaRPr lang="en-GB"/>
           </a:p>
@@ -2934,7 +2934,7 @@
           <a:p>
             <a:fld id="{07BEF4AF-FE93-48EE-A03F-18E680F520CD}" type="datetimeFigureOut">
               <a:rPr lang="en-GB" smtClean="0"/>
-              <a:t>20/08/2023</a:t>
+              <a:t>21/08/2023</a:t>
             </a:fld>
             <a:endParaRPr lang="en-GB"/>
           </a:p>
@@ -3937,10 +3937,10 @@
       </p:grpSpPr>
       <p:pic>
         <p:nvPicPr>
-          <p:cNvPr id="3" name="Picture 2">
-            <a:extLst>
-              <a:ext uri="{FF2B5EF4-FFF2-40B4-BE49-F238E27FC236}">
-                <a16:creationId xmlns:a16="http://schemas.microsoft.com/office/drawing/2014/main" id="{AF0CCB1E-1626-4F7A-8221-5D082799511D}"/>
+          <p:cNvPr id="5" name="Picture 4">
+            <a:extLst>
+              <a:ext uri="{FF2B5EF4-FFF2-40B4-BE49-F238E27FC236}">
+                <a16:creationId xmlns:a16="http://schemas.microsoft.com/office/drawing/2014/main" id="{92B0A4FA-4E89-0B40-AACC-51F009767C36}"/>
               </a:ext>
             </a:extLst>
           </p:cNvPr>
@@ -3957,8 +3957,8 @@
         </p:blipFill>
         <p:spPr>
           <a:xfrm>
-            <a:off x="980463" y="1063933"/>
-            <a:ext cx="8991600" cy="1781175"/>
+            <a:off x="1620915" y="3429000"/>
+            <a:ext cx="10287000" cy="3152775"/>
           </a:xfrm>
           <a:prstGeom prst="rect">
             <a:avLst/>
@@ -3972,10 +3972,10 @@
       </p:pic>
       <p:pic>
         <p:nvPicPr>
-          <p:cNvPr id="5" name="Picture 4">
-            <a:extLst>
-              <a:ext uri="{FF2B5EF4-FFF2-40B4-BE49-F238E27FC236}">
-                <a16:creationId xmlns:a16="http://schemas.microsoft.com/office/drawing/2014/main" id="{92B0A4FA-4E89-0B40-AACC-51F009767C36}"/>
+          <p:cNvPr id="3" name="Picture 2">
+            <a:extLst>
+              <a:ext uri="{FF2B5EF4-FFF2-40B4-BE49-F238E27FC236}">
+                <a16:creationId xmlns:a16="http://schemas.microsoft.com/office/drawing/2014/main" id="{AF0CCB1E-1626-4F7A-8221-5D082799511D}"/>
               </a:ext>
             </a:extLst>
           </p:cNvPr>
@@ -3992,8 +3992,8 @@
         </p:blipFill>
         <p:spPr>
           <a:xfrm>
-            <a:off x="1620915" y="3429000"/>
-            <a:ext cx="10287000" cy="3152775"/>
+            <a:off x="980463" y="1063933"/>
+            <a:ext cx="8991600" cy="1781175"/>
           </a:xfrm>
           <a:prstGeom prst="rect">
             <a:avLst/>
@@ -4206,14 +4206,1045 @@
         </p:blipFill>
         <p:spPr>
           <a:xfrm>
-            <a:off x="2381250" y="2728912"/>
-            <a:ext cx="7429500" cy="1400175"/>
+            <a:off x="747842" y="497145"/>
+            <a:ext cx="9897409" cy="1865281"/>
           </a:xfrm>
           <a:prstGeom prst="rect">
             <a:avLst/>
           </a:prstGeom>
         </p:spPr>
       </p:pic>
+      <p:cxnSp>
+        <p:nvCxnSpPr>
+          <p:cNvPr id="4" name="Straight Arrow Connector 3">
+            <a:extLst>
+              <a:ext uri="{FF2B5EF4-FFF2-40B4-BE49-F238E27FC236}">
+                <a16:creationId xmlns:a16="http://schemas.microsoft.com/office/drawing/2014/main" id="{4009AAF2-9A10-A77F-8C35-6CF23ECDE41E}"/>
+              </a:ext>
+            </a:extLst>
+          </p:cNvPr>
+          <p:cNvCxnSpPr>
+            <a:cxnSpLocks/>
+          </p:cNvCxnSpPr>
+          <p:nvPr/>
+        </p:nvCxnSpPr>
+        <p:spPr>
+          <a:xfrm>
+            <a:off x="2024109" y="1970838"/>
+            <a:ext cx="1423960" cy="2193048"/>
+          </a:xfrm>
+          <a:prstGeom prst="straightConnector1">
+            <a:avLst/>
+          </a:prstGeom>
+          <a:ln w="31750">
+            <a:solidFill>
+              <a:srgbClr val="FFFF00"/>
+            </a:solidFill>
+            <a:tailEnd type="triangle"/>
+          </a:ln>
+        </p:spPr>
+        <p:style>
+          <a:lnRef idx="1">
+            <a:schemeClr val="accent1"/>
+          </a:lnRef>
+          <a:fillRef idx="0">
+            <a:schemeClr val="accent1"/>
+          </a:fillRef>
+          <a:effectRef idx="0">
+            <a:schemeClr val="accent1"/>
+          </a:effectRef>
+          <a:fontRef idx="minor">
+            <a:schemeClr val="tx1"/>
+          </a:fontRef>
+        </p:style>
+      </p:cxnSp>
+      <p:sp>
+        <p:nvSpPr>
+          <p:cNvPr id="6" name="Rectangle 5">
+            <a:extLst>
+              <a:ext uri="{FF2B5EF4-FFF2-40B4-BE49-F238E27FC236}">
+                <a16:creationId xmlns:a16="http://schemas.microsoft.com/office/drawing/2014/main" id="{2427FA44-2EBC-D09D-1AB1-C0B7EAC5C0D3}"/>
+              </a:ext>
+            </a:extLst>
+          </p:cNvPr>
+          <p:cNvSpPr/>
+          <p:nvPr/>
+        </p:nvSpPr>
+        <p:spPr>
+          <a:xfrm>
+            <a:off x="1149675" y="1700081"/>
+            <a:ext cx="1220664" cy="355107"/>
+          </a:xfrm>
+          <a:prstGeom prst="rect">
+            <a:avLst/>
+          </a:prstGeom>
+          <a:noFill/>
+          <a:ln w="25400" cap="rnd">
+            <a:solidFill>
+              <a:srgbClr val="FFFF00"/>
+            </a:solidFill>
+          </a:ln>
+        </p:spPr>
+        <p:style>
+          <a:lnRef idx="2">
+            <a:schemeClr val="accent1">
+              <a:shade val="15000"/>
+            </a:schemeClr>
+          </a:lnRef>
+          <a:fillRef idx="1">
+            <a:schemeClr val="accent1"/>
+          </a:fillRef>
+          <a:effectRef idx="0">
+            <a:schemeClr val="accent1"/>
+          </a:effectRef>
+          <a:fontRef idx="minor">
+            <a:schemeClr val="lt1"/>
+          </a:fontRef>
+        </p:style>
+        <p:txBody>
+          <a:bodyPr rtlCol="0" anchor="ctr"/>
+          <a:lstStyle/>
+          <a:p>
+            <a:pPr algn="ctr"/>
+            <a:endParaRPr lang="en-GB"/>
+          </a:p>
+        </p:txBody>
+      </p:sp>
+      <p:sp>
+        <p:nvSpPr>
+          <p:cNvPr id="7" name="TextBox 6">
+            <a:extLst>
+              <a:ext uri="{FF2B5EF4-FFF2-40B4-BE49-F238E27FC236}">
+                <a16:creationId xmlns:a16="http://schemas.microsoft.com/office/drawing/2014/main" id="{712D5181-2B02-D131-065B-24D85FA12493}"/>
+              </a:ext>
+            </a:extLst>
+          </p:cNvPr>
+          <p:cNvSpPr txBox="1"/>
+          <p:nvPr/>
+        </p:nvSpPr>
+        <p:spPr>
+          <a:xfrm>
+            <a:off x="569908" y="4319244"/>
+            <a:ext cx="3611475" cy="923330"/>
+          </a:xfrm>
+          <a:prstGeom prst="rect">
+            <a:avLst/>
+          </a:prstGeom>
+          <a:noFill/>
+          <a:ln>
+            <a:solidFill>
+              <a:schemeClr val="accent1"/>
+            </a:solidFill>
+          </a:ln>
+        </p:spPr>
+        <p:txBody>
+          <a:bodyPr wrap="square" rtlCol="0">
+            <a:spAutoFit/>
+          </a:bodyPr>
+          <a:lstStyle/>
+          <a:p>
+            <a:r>
+              <a:rPr lang="en-GB" dirty="0"/>
+              <a:t>The </a:t>
+            </a:r>
+            <a:r>
+              <a:rPr lang="en-GB" b="1" dirty="0"/>
+              <a:t>Build</a:t>
+            </a:r>
+            <a:r>
+              <a:rPr lang="en-GB" dirty="0"/>
+              <a:t> stage publishes the artifact(s) using </a:t>
+            </a:r>
+            <a:r>
+              <a:rPr lang="en-GB" b="1" dirty="0" err="1"/>
+              <a:t>PublishPipelineArtifact</a:t>
+            </a:r>
+            <a:r>
+              <a:rPr lang="en-GB" dirty="0"/>
+              <a:t> task</a:t>
+            </a:r>
+          </a:p>
+        </p:txBody>
+      </p:sp>
+      <p:cxnSp>
+        <p:nvCxnSpPr>
+          <p:cNvPr id="8" name="Straight Arrow Connector 7">
+            <a:extLst>
+              <a:ext uri="{FF2B5EF4-FFF2-40B4-BE49-F238E27FC236}">
+                <a16:creationId xmlns:a16="http://schemas.microsoft.com/office/drawing/2014/main" id="{B0DFC707-AC60-F916-457A-1F2130474F41}"/>
+              </a:ext>
+            </a:extLst>
+          </p:cNvPr>
+          <p:cNvCxnSpPr>
+            <a:cxnSpLocks/>
+            <a:endCxn id="12" idx="0"/>
+          </p:cNvCxnSpPr>
+          <p:nvPr/>
+        </p:nvCxnSpPr>
+        <p:spPr>
+          <a:xfrm>
+            <a:off x="5956917" y="1544710"/>
+            <a:ext cx="1247799" cy="2774534"/>
+          </a:xfrm>
+          <a:prstGeom prst="straightConnector1">
+            <a:avLst/>
+          </a:prstGeom>
+          <a:ln w="31750">
+            <a:solidFill>
+              <a:srgbClr val="FFFF00"/>
+            </a:solidFill>
+            <a:tailEnd type="triangle"/>
+          </a:ln>
+        </p:spPr>
+        <p:style>
+          <a:lnRef idx="1">
+            <a:schemeClr val="accent1"/>
+          </a:lnRef>
+          <a:fillRef idx="0">
+            <a:schemeClr val="accent1"/>
+          </a:fillRef>
+          <a:effectRef idx="0">
+            <a:schemeClr val="accent1"/>
+          </a:effectRef>
+          <a:fontRef idx="minor">
+            <a:schemeClr val="tx1"/>
+          </a:fontRef>
+        </p:style>
+      </p:cxnSp>
+      <p:cxnSp>
+        <p:nvCxnSpPr>
+          <p:cNvPr id="10" name="Straight Arrow Connector 9">
+            <a:extLst>
+              <a:ext uri="{FF2B5EF4-FFF2-40B4-BE49-F238E27FC236}">
+                <a16:creationId xmlns:a16="http://schemas.microsoft.com/office/drawing/2014/main" id="{5952B7E9-669F-8DAD-AD00-BE1B94E4548E}"/>
+              </a:ext>
+            </a:extLst>
+          </p:cNvPr>
+          <p:cNvCxnSpPr>
+            <a:cxnSpLocks/>
+          </p:cNvCxnSpPr>
+          <p:nvPr/>
+        </p:nvCxnSpPr>
+        <p:spPr>
+          <a:xfrm flipH="1">
+            <a:off x="7501631" y="1566905"/>
+            <a:ext cx="1775343" cy="2752339"/>
+          </a:xfrm>
+          <a:prstGeom prst="straightConnector1">
+            <a:avLst/>
+          </a:prstGeom>
+          <a:ln w="31750">
+            <a:solidFill>
+              <a:srgbClr val="FFFF00"/>
+            </a:solidFill>
+            <a:tailEnd type="triangle"/>
+          </a:ln>
+        </p:spPr>
+        <p:style>
+          <a:lnRef idx="1">
+            <a:schemeClr val="accent1"/>
+          </a:lnRef>
+          <a:fillRef idx="0">
+            <a:schemeClr val="accent1"/>
+          </a:fillRef>
+          <a:effectRef idx="0">
+            <a:schemeClr val="accent1"/>
+          </a:effectRef>
+          <a:fontRef idx="minor">
+            <a:schemeClr val="tx1"/>
+          </a:fontRef>
+        </p:style>
+      </p:cxnSp>
+      <p:sp>
+        <p:nvSpPr>
+          <p:cNvPr id="12" name="TextBox 11">
+            <a:extLst>
+              <a:ext uri="{FF2B5EF4-FFF2-40B4-BE49-F238E27FC236}">
+                <a16:creationId xmlns:a16="http://schemas.microsoft.com/office/drawing/2014/main" id="{CE798734-D834-35D1-7B0D-B3952742B246}"/>
+              </a:ext>
+            </a:extLst>
+          </p:cNvPr>
+          <p:cNvSpPr txBox="1"/>
+          <p:nvPr/>
+        </p:nvSpPr>
+        <p:spPr>
+          <a:xfrm>
+            <a:off x="5398978" y="4319244"/>
+            <a:ext cx="3611475" cy="923330"/>
+          </a:xfrm>
+          <a:prstGeom prst="rect">
+            <a:avLst/>
+          </a:prstGeom>
+          <a:noFill/>
+          <a:ln>
+            <a:solidFill>
+              <a:schemeClr val="accent1"/>
+            </a:solidFill>
+          </a:ln>
+        </p:spPr>
+        <p:txBody>
+          <a:bodyPr wrap="square" rtlCol="0">
+            <a:spAutoFit/>
+          </a:bodyPr>
+          <a:lstStyle/>
+          <a:p>
+            <a:r>
+              <a:rPr lang="en-GB" dirty="0"/>
+              <a:t>The </a:t>
+            </a:r>
+            <a:r>
+              <a:rPr lang="en-GB" b="1" dirty="0"/>
+              <a:t>Deploy</a:t>
+            </a:r>
+            <a:r>
+              <a:rPr lang="en-GB" dirty="0"/>
+              <a:t> stage restores the artifact(s) from the Build stage using the </a:t>
+            </a:r>
+            <a:r>
+              <a:rPr lang="en-GB" b="1" dirty="0" err="1"/>
+              <a:t>DownloadPipelineArtifact</a:t>
+            </a:r>
+            <a:r>
+              <a:rPr lang="en-GB" dirty="0"/>
+              <a:t> task</a:t>
+            </a:r>
+          </a:p>
+        </p:txBody>
+      </p:sp>
+      <p:sp>
+        <p:nvSpPr>
+          <p:cNvPr id="17" name="TextBox 16">
+            <a:extLst>
+              <a:ext uri="{FF2B5EF4-FFF2-40B4-BE49-F238E27FC236}">
+                <a16:creationId xmlns:a16="http://schemas.microsoft.com/office/drawing/2014/main" id="{DD64918C-DC05-6F79-3DF9-8A7BD51F3E82}"/>
+              </a:ext>
+            </a:extLst>
+          </p:cNvPr>
+          <p:cNvSpPr txBox="1"/>
+          <p:nvPr/>
+        </p:nvSpPr>
+        <p:spPr>
+          <a:xfrm>
+            <a:off x="9010453" y="2839880"/>
+            <a:ext cx="2823481" cy="830997"/>
+          </a:xfrm>
+          <a:prstGeom prst="rect">
+            <a:avLst/>
+          </a:prstGeom>
+        </p:spPr>
+        <p:style>
+          <a:lnRef idx="2">
+            <a:schemeClr val="accent1"/>
+          </a:lnRef>
+          <a:fillRef idx="1">
+            <a:schemeClr val="lt1"/>
+          </a:fillRef>
+          <a:effectRef idx="0">
+            <a:schemeClr val="accent1"/>
+          </a:effectRef>
+          <a:fontRef idx="minor">
+            <a:schemeClr val="dk1"/>
+          </a:fontRef>
+        </p:style>
+        <p:txBody>
+          <a:bodyPr wrap="square" rtlCol="0">
+            <a:spAutoFit/>
+          </a:bodyPr>
+          <a:lstStyle/>
+          <a:p>
+            <a:endParaRPr lang="en-US" sz="800" b="0" dirty="0">
+              <a:solidFill>
+                <a:srgbClr val="333333"/>
+              </a:solidFill>
+              <a:effectLst/>
+              <a:latin typeface="Consolas" panose="020B0609020204030204" pitchFamily="49" charset="0"/>
+            </a:endParaRPr>
+          </a:p>
+          <a:p>
+            <a:r>
+              <a:rPr lang="en-US" sz="800" b="0" dirty="0">
+                <a:solidFill>
+                  <a:srgbClr val="000000"/>
+                </a:solidFill>
+                <a:effectLst/>
+                <a:latin typeface="Consolas" panose="020B0609020204030204" pitchFamily="49" charset="0"/>
+              </a:rPr>
+              <a:t>-</a:t>
+            </a:r>
+            <a:r>
+              <a:rPr lang="en-US" sz="800" b="0" dirty="0">
+                <a:solidFill>
+                  <a:srgbClr val="333333"/>
+                </a:solidFill>
+                <a:effectLst/>
+                <a:latin typeface="Consolas" panose="020B0609020204030204" pitchFamily="49" charset="0"/>
+              </a:rPr>
+              <a:t> </a:t>
+            </a:r>
+            <a:r>
+              <a:rPr lang="en-US" sz="800" b="0" dirty="0">
+                <a:solidFill>
+                  <a:srgbClr val="8B0000"/>
+                </a:solidFill>
+                <a:effectLst/>
+                <a:latin typeface="Consolas" panose="020B0609020204030204" pitchFamily="49" charset="0"/>
+              </a:rPr>
+              <a:t>task</a:t>
+            </a:r>
+            <a:r>
+              <a:rPr lang="en-US" sz="800" b="0" dirty="0">
+                <a:solidFill>
+                  <a:srgbClr val="000000"/>
+                </a:solidFill>
+                <a:effectLst/>
+                <a:latin typeface="Consolas" panose="020B0609020204030204" pitchFamily="49" charset="0"/>
+              </a:rPr>
+              <a:t>:</a:t>
+            </a:r>
+            <a:r>
+              <a:rPr lang="en-US" sz="800" b="0" dirty="0">
+                <a:solidFill>
+                  <a:srgbClr val="333333"/>
+                </a:solidFill>
+                <a:effectLst/>
+                <a:latin typeface="Consolas" panose="020B0609020204030204" pitchFamily="49" charset="0"/>
+              </a:rPr>
+              <a:t> </a:t>
+            </a:r>
+            <a:r>
+              <a:rPr lang="en-US" sz="800" b="1" dirty="0">
+                <a:solidFill>
+                  <a:srgbClr val="8B0000"/>
+                </a:solidFill>
+                <a:effectLst/>
+                <a:latin typeface="Consolas" panose="020B0609020204030204" pitchFamily="49" charset="0"/>
+              </a:rPr>
+              <a:t>DownloadPipelineArtifact</a:t>
+            </a:r>
+            <a:r>
+              <a:rPr lang="en-US" sz="800" b="0" dirty="0">
+                <a:solidFill>
+                  <a:srgbClr val="8B0000"/>
+                </a:solidFill>
+                <a:effectLst/>
+                <a:latin typeface="Consolas" panose="020B0609020204030204" pitchFamily="49" charset="0"/>
+              </a:rPr>
+              <a:t>@2</a:t>
+            </a:r>
+            <a:endParaRPr lang="en-US" sz="800" b="0" dirty="0">
+              <a:solidFill>
+                <a:srgbClr val="333333"/>
+              </a:solidFill>
+              <a:effectLst/>
+              <a:latin typeface="Consolas" panose="020B0609020204030204" pitchFamily="49" charset="0"/>
+            </a:endParaRPr>
+          </a:p>
+          <a:p>
+            <a:r>
+              <a:rPr lang="en-US" sz="800" b="0" dirty="0">
+                <a:solidFill>
+                  <a:srgbClr val="333333"/>
+                </a:solidFill>
+                <a:effectLst/>
+                <a:latin typeface="Consolas" panose="020B0609020204030204" pitchFamily="49" charset="0"/>
+              </a:rPr>
+              <a:t>  </a:t>
+            </a:r>
+            <a:r>
+              <a:rPr lang="en-US" sz="800" b="0" dirty="0">
+                <a:solidFill>
+                  <a:srgbClr val="8B0000"/>
+                </a:solidFill>
+                <a:effectLst/>
+                <a:latin typeface="Consolas" panose="020B0609020204030204" pitchFamily="49" charset="0"/>
+              </a:rPr>
+              <a:t>inputs</a:t>
+            </a:r>
+            <a:r>
+              <a:rPr lang="en-US" sz="800" b="0" dirty="0">
+                <a:solidFill>
+                  <a:srgbClr val="000000"/>
+                </a:solidFill>
+                <a:effectLst/>
+                <a:latin typeface="Consolas" panose="020B0609020204030204" pitchFamily="49" charset="0"/>
+              </a:rPr>
+              <a:t>:</a:t>
+            </a:r>
+            <a:endParaRPr lang="en-US" sz="800" b="0" dirty="0">
+              <a:solidFill>
+                <a:srgbClr val="333333"/>
+              </a:solidFill>
+              <a:effectLst/>
+              <a:latin typeface="Consolas" panose="020B0609020204030204" pitchFamily="49" charset="0"/>
+            </a:endParaRPr>
+          </a:p>
+          <a:p>
+            <a:r>
+              <a:rPr lang="en-US" sz="800" b="0" dirty="0">
+                <a:solidFill>
+                  <a:srgbClr val="333333"/>
+                </a:solidFill>
+                <a:effectLst/>
+                <a:latin typeface="Consolas" panose="020B0609020204030204" pitchFamily="49" charset="0"/>
+              </a:rPr>
+              <a:t>    </a:t>
+            </a:r>
+            <a:r>
+              <a:rPr lang="en-US" sz="800" b="0" dirty="0">
+                <a:solidFill>
+                  <a:srgbClr val="8B0000"/>
+                </a:solidFill>
+                <a:effectLst/>
+                <a:latin typeface="Consolas" panose="020B0609020204030204" pitchFamily="49" charset="0"/>
+              </a:rPr>
+              <a:t>artifact</a:t>
+            </a:r>
+            <a:r>
+              <a:rPr lang="en-US" sz="800" b="0" dirty="0">
+                <a:solidFill>
+                  <a:srgbClr val="000000"/>
+                </a:solidFill>
+                <a:effectLst/>
+                <a:latin typeface="Consolas" panose="020B0609020204030204" pitchFamily="49" charset="0"/>
+              </a:rPr>
+              <a:t>:</a:t>
+            </a:r>
+            <a:r>
+              <a:rPr lang="en-US" sz="800" b="0" dirty="0">
+                <a:solidFill>
+                  <a:srgbClr val="333333"/>
+                </a:solidFill>
+                <a:effectLst/>
+                <a:latin typeface="Consolas" panose="020B0609020204030204" pitchFamily="49" charset="0"/>
+              </a:rPr>
+              <a:t> </a:t>
+            </a:r>
+          </a:p>
+          <a:p>
+            <a:r>
+              <a:rPr lang="en-US" sz="800" b="0" dirty="0">
+                <a:solidFill>
+                  <a:srgbClr val="333333"/>
+                </a:solidFill>
+                <a:effectLst/>
+                <a:latin typeface="Consolas" panose="020B0609020204030204" pitchFamily="49" charset="0"/>
+              </a:rPr>
+              <a:t>    </a:t>
+            </a:r>
+            <a:r>
+              <a:rPr lang="en-US" sz="800" b="0" dirty="0">
+                <a:solidFill>
+                  <a:srgbClr val="8B0000"/>
+                </a:solidFill>
+                <a:effectLst/>
+                <a:latin typeface="Consolas" panose="020B0609020204030204" pitchFamily="49" charset="0"/>
+              </a:rPr>
+              <a:t>path</a:t>
+            </a:r>
+            <a:r>
+              <a:rPr lang="en-US" sz="800" b="0" dirty="0">
+                <a:solidFill>
+                  <a:srgbClr val="000000"/>
+                </a:solidFill>
+                <a:effectLst/>
+                <a:latin typeface="Consolas" panose="020B0609020204030204" pitchFamily="49" charset="0"/>
+              </a:rPr>
+              <a:t>:</a:t>
+            </a:r>
+            <a:r>
+              <a:rPr lang="en-US" sz="800" b="0" dirty="0">
+                <a:solidFill>
+                  <a:srgbClr val="333333"/>
+                </a:solidFill>
+                <a:effectLst/>
+                <a:latin typeface="Consolas" panose="020B0609020204030204" pitchFamily="49" charset="0"/>
+              </a:rPr>
+              <a:t> </a:t>
+            </a:r>
+            <a:r>
+              <a:rPr lang="en-US" sz="800" b="0" dirty="0">
+                <a:solidFill>
+                  <a:srgbClr val="8B0000"/>
+                </a:solidFill>
+                <a:effectLst/>
+                <a:latin typeface="Consolas" panose="020B0609020204030204" pitchFamily="49" charset="0"/>
+              </a:rPr>
+              <a:t>$(</a:t>
+            </a:r>
+            <a:r>
+              <a:rPr lang="en-US" sz="800" b="0" dirty="0" err="1">
+                <a:solidFill>
+                  <a:srgbClr val="8B0000"/>
+                </a:solidFill>
+                <a:effectLst/>
+                <a:latin typeface="Consolas" panose="020B0609020204030204" pitchFamily="49" charset="0"/>
+              </a:rPr>
+              <a:t>Build.Workspace</a:t>
+            </a:r>
+            <a:r>
+              <a:rPr lang="en-US" sz="800" b="0" dirty="0">
+                <a:solidFill>
+                  <a:srgbClr val="8B0000"/>
+                </a:solidFill>
+                <a:effectLst/>
+                <a:latin typeface="Consolas" panose="020B0609020204030204" pitchFamily="49" charset="0"/>
+              </a:rPr>
+              <a:t>)/demo/artifacts</a:t>
+            </a:r>
+            <a:endParaRPr lang="en-US" sz="800" b="0" dirty="0">
+              <a:solidFill>
+                <a:srgbClr val="333333"/>
+              </a:solidFill>
+              <a:effectLst/>
+              <a:latin typeface="Consolas" panose="020B0609020204030204" pitchFamily="49" charset="0"/>
+            </a:endParaRPr>
+          </a:p>
+          <a:p>
+            <a:endParaRPr lang="en-GB" sz="800" dirty="0"/>
+          </a:p>
+        </p:txBody>
+      </p:sp>
+      <p:sp>
+        <p:nvSpPr>
+          <p:cNvPr id="18" name="TextBox 17">
+            <a:extLst>
+              <a:ext uri="{FF2B5EF4-FFF2-40B4-BE49-F238E27FC236}">
+                <a16:creationId xmlns:a16="http://schemas.microsoft.com/office/drawing/2014/main" id="{F3B2BEE2-3CA9-C772-31B2-D334020B397B}"/>
+              </a:ext>
+            </a:extLst>
+          </p:cNvPr>
+          <p:cNvSpPr txBox="1"/>
+          <p:nvPr/>
+        </p:nvSpPr>
+        <p:spPr>
+          <a:xfrm>
+            <a:off x="315454" y="2839880"/>
+            <a:ext cx="3253370" cy="1077218"/>
+          </a:xfrm>
+          <a:prstGeom prst="rect">
+            <a:avLst/>
+          </a:prstGeom>
+        </p:spPr>
+        <p:style>
+          <a:lnRef idx="2">
+            <a:schemeClr val="accent1"/>
+          </a:lnRef>
+          <a:fillRef idx="1">
+            <a:schemeClr val="lt1"/>
+          </a:fillRef>
+          <a:effectRef idx="0">
+            <a:schemeClr val="accent1"/>
+          </a:effectRef>
+          <a:fontRef idx="minor">
+            <a:schemeClr val="dk1"/>
+          </a:fontRef>
+        </p:style>
+        <p:txBody>
+          <a:bodyPr wrap="square" rtlCol="0">
+            <a:spAutoFit/>
+          </a:bodyPr>
+          <a:lstStyle/>
+          <a:p>
+            <a:r>
+              <a:rPr lang="en-GB" sz="800" b="0" dirty="0">
+                <a:solidFill>
+                  <a:srgbClr val="000000"/>
+                </a:solidFill>
+                <a:effectLst/>
+                <a:latin typeface="Consolas" panose="020B0609020204030204" pitchFamily="49" charset="0"/>
+              </a:rPr>
+              <a:t>-</a:t>
+            </a:r>
+            <a:r>
+              <a:rPr lang="en-GB" sz="800" b="0" dirty="0">
+                <a:solidFill>
+                  <a:srgbClr val="333333"/>
+                </a:solidFill>
+                <a:effectLst/>
+                <a:latin typeface="Consolas" panose="020B0609020204030204" pitchFamily="49" charset="0"/>
+              </a:rPr>
+              <a:t> </a:t>
+            </a:r>
+            <a:r>
+              <a:rPr lang="en-GB" sz="800" b="0" dirty="0">
+                <a:solidFill>
+                  <a:srgbClr val="8B0000"/>
+                </a:solidFill>
+                <a:effectLst/>
+                <a:latin typeface="Consolas" panose="020B0609020204030204" pitchFamily="49" charset="0"/>
+              </a:rPr>
+              <a:t>task</a:t>
+            </a:r>
+            <a:r>
+              <a:rPr lang="en-GB" sz="800" b="0" dirty="0">
+                <a:solidFill>
+                  <a:srgbClr val="000000"/>
+                </a:solidFill>
+                <a:effectLst/>
+                <a:latin typeface="Consolas" panose="020B0609020204030204" pitchFamily="49" charset="0"/>
+              </a:rPr>
+              <a:t>:</a:t>
+            </a:r>
+            <a:r>
+              <a:rPr lang="en-GB" sz="800" b="0" dirty="0">
+                <a:solidFill>
+                  <a:srgbClr val="333333"/>
+                </a:solidFill>
+                <a:effectLst/>
+                <a:latin typeface="Consolas" panose="020B0609020204030204" pitchFamily="49" charset="0"/>
+              </a:rPr>
+              <a:t> </a:t>
+            </a:r>
+            <a:r>
+              <a:rPr lang="en-GB" sz="800" b="1" dirty="0">
+                <a:solidFill>
+                  <a:srgbClr val="8B0000"/>
+                </a:solidFill>
+                <a:effectLst/>
+                <a:latin typeface="Consolas" panose="020B0609020204030204" pitchFamily="49" charset="0"/>
+              </a:rPr>
+              <a:t>PublishPipelineArtifact</a:t>
+            </a:r>
+            <a:r>
+              <a:rPr lang="en-GB" sz="800" b="0" dirty="0">
+                <a:solidFill>
+                  <a:srgbClr val="8B0000"/>
+                </a:solidFill>
+                <a:effectLst/>
+                <a:latin typeface="Consolas" panose="020B0609020204030204" pitchFamily="49" charset="0"/>
+              </a:rPr>
+              <a:t>@1</a:t>
+            </a:r>
+            <a:endParaRPr lang="en-GB" sz="800" b="0" dirty="0">
+              <a:solidFill>
+                <a:srgbClr val="333333"/>
+              </a:solidFill>
+              <a:effectLst/>
+              <a:latin typeface="Consolas" panose="020B0609020204030204" pitchFamily="49" charset="0"/>
+            </a:endParaRPr>
+          </a:p>
+          <a:p>
+            <a:r>
+              <a:rPr lang="en-GB" sz="800" b="0" dirty="0">
+                <a:solidFill>
+                  <a:srgbClr val="333333"/>
+                </a:solidFill>
+                <a:effectLst/>
+                <a:latin typeface="Consolas" panose="020B0609020204030204" pitchFamily="49" charset="0"/>
+              </a:rPr>
+              <a:t>  </a:t>
+            </a:r>
+            <a:r>
+              <a:rPr lang="en-GB" sz="800" b="0" dirty="0" err="1">
+                <a:solidFill>
+                  <a:srgbClr val="8B0000"/>
+                </a:solidFill>
+                <a:effectLst/>
+                <a:latin typeface="Consolas" panose="020B0609020204030204" pitchFamily="49" charset="0"/>
+              </a:rPr>
+              <a:t>displayName</a:t>
+            </a:r>
+            <a:r>
+              <a:rPr lang="en-GB" sz="800" b="0" dirty="0">
+                <a:solidFill>
+                  <a:srgbClr val="000000"/>
+                </a:solidFill>
+                <a:effectLst/>
+                <a:latin typeface="Consolas" panose="020B0609020204030204" pitchFamily="49" charset="0"/>
+              </a:rPr>
+              <a:t>:</a:t>
+            </a:r>
+            <a:r>
+              <a:rPr lang="en-GB" sz="800" b="0" dirty="0">
+                <a:solidFill>
+                  <a:srgbClr val="333333"/>
+                </a:solidFill>
+                <a:effectLst/>
+                <a:latin typeface="Consolas" panose="020B0609020204030204" pitchFamily="49" charset="0"/>
+              </a:rPr>
+              <a:t> </a:t>
+            </a:r>
+            <a:r>
+              <a:rPr lang="en-GB" sz="800" b="0" dirty="0">
+                <a:solidFill>
+                  <a:srgbClr val="000000"/>
+                </a:solidFill>
+                <a:effectLst/>
+                <a:latin typeface="Consolas" panose="020B0609020204030204" pitchFamily="49" charset="0"/>
+              </a:rPr>
+              <a:t>'</a:t>
+            </a:r>
+            <a:r>
+              <a:rPr lang="en-GB" sz="800" b="0" dirty="0">
+                <a:solidFill>
+                  <a:srgbClr val="8B0000"/>
+                </a:solidFill>
+                <a:effectLst/>
+                <a:latin typeface="Consolas" panose="020B0609020204030204" pitchFamily="49" charset="0"/>
+              </a:rPr>
+              <a:t>Publish Python source folder</a:t>
+            </a:r>
+            <a:r>
+              <a:rPr lang="en-GB" sz="800" b="0" dirty="0">
+                <a:solidFill>
+                  <a:srgbClr val="000000"/>
+                </a:solidFill>
+                <a:effectLst/>
+                <a:latin typeface="Consolas" panose="020B0609020204030204" pitchFamily="49" charset="0"/>
+              </a:rPr>
+              <a:t>'</a:t>
+            </a:r>
+            <a:endParaRPr lang="en-GB" sz="800" b="0" dirty="0">
+              <a:solidFill>
+                <a:srgbClr val="333333"/>
+              </a:solidFill>
+              <a:effectLst/>
+              <a:latin typeface="Consolas" panose="020B0609020204030204" pitchFamily="49" charset="0"/>
+            </a:endParaRPr>
+          </a:p>
+          <a:p>
+            <a:r>
+              <a:rPr lang="en-GB" sz="800" b="0" dirty="0">
+                <a:solidFill>
+                  <a:srgbClr val="333333"/>
+                </a:solidFill>
+                <a:effectLst/>
+                <a:latin typeface="Consolas" panose="020B0609020204030204" pitchFamily="49" charset="0"/>
+              </a:rPr>
+              <a:t>  </a:t>
+            </a:r>
+            <a:r>
+              <a:rPr lang="en-GB" sz="800" b="0" dirty="0">
+                <a:solidFill>
+                  <a:srgbClr val="8B0000"/>
+                </a:solidFill>
+                <a:effectLst/>
+                <a:latin typeface="Consolas" panose="020B0609020204030204" pitchFamily="49" charset="0"/>
+              </a:rPr>
+              <a:t>inputs</a:t>
+            </a:r>
+            <a:r>
+              <a:rPr lang="en-GB" sz="800" b="0" dirty="0">
+                <a:solidFill>
+                  <a:srgbClr val="000000"/>
+                </a:solidFill>
+                <a:effectLst/>
+                <a:latin typeface="Consolas" panose="020B0609020204030204" pitchFamily="49" charset="0"/>
+              </a:rPr>
+              <a:t>:</a:t>
+            </a:r>
+            <a:endParaRPr lang="en-GB" sz="800" b="0" dirty="0">
+              <a:solidFill>
+                <a:srgbClr val="333333"/>
+              </a:solidFill>
+              <a:effectLst/>
+              <a:latin typeface="Consolas" panose="020B0609020204030204" pitchFamily="49" charset="0"/>
+            </a:endParaRPr>
+          </a:p>
+          <a:p>
+            <a:r>
+              <a:rPr lang="en-GB" sz="800" b="0" dirty="0">
+                <a:solidFill>
+                  <a:srgbClr val="333333"/>
+                </a:solidFill>
+                <a:effectLst/>
+                <a:latin typeface="Consolas" panose="020B0609020204030204" pitchFamily="49" charset="0"/>
+              </a:rPr>
+              <a:t>    </a:t>
+            </a:r>
+            <a:r>
+              <a:rPr lang="en-GB" sz="800" b="0" dirty="0" err="1">
+                <a:solidFill>
+                  <a:srgbClr val="8B0000"/>
+                </a:solidFill>
+                <a:effectLst/>
+                <a:latin typeface="Consolas" panose="020B0609020204030204" pitchFamily="49" charset="0"/>
+              </a:rPr>
+              <a:t>targetPath</a:t>
+            </a:r>
+            <a:r>
+              <a:rPr lang="en-GB" sz="800" b="0" dirty="0">
+                <a:solidFill>
+                  <a:srgbClr val="000000"/>
+                </a:solidFill>
+                <a:effectLst/>
+                <a:latin typeface="Consolas" panose="020B0609020204030204" pitchFamily="49" charset="0"/>
+              </a:rPr>
+              <a:t>:</a:t>
+            </a:r>
+            <a:r>
+              <a:rPr lang="en-GB" sz="800" b="0" dirty="0">
+                <a:solidFill>
+                  <a:srgbClr val="333333"/>
+                </a:solidFill>
+                <a:effectLst/>
+                <a:latin typeface="Consolas" panose="020B0609020204030204" pitchFamily="49" charset="0"/>
+              </a:rPr>
+              <a:t> </a:t>
+            </a:r>
+            <a:r>
+              <a:rPr lang="en-GB" sz="800" b="0" dirty="0">
+                <a:solidFill>
+                  <a:srgbClr val="8B0000"/>
+                </a:solidFill>
+                <a:effectLst/>
+                <a:latin typeface="Consolas" panose="020B0609020204030204" pitchFamily="49" charset="0"/>
+              </a:rPr>
+              <a:t>$(</a:t>
+            </a:r>
+            <a:r>
+              <a:rPr lang="en-GB" sz="800" b="0" dirty="0" err="1">
+                <a:solidFill>
+                  <a:srgbClr val="8B0000"/>
+                </a:solidFill>
+                <a:effectLst/>
+                <a:latin typeface="Consolas" panose="020B0609020204030204" pitchFamily="49" charset="0"/>
+              </a:rPr>
+              <a:t>Build.SourcesDirectory</a:t>
+            </a:r>
+            <a:r>
+              <a:rPr lang="en-GB" sz="800" b="0" dirty="0">
+                <a:solidFill>
+                  <a:srgbClr val="8B0000"/>
+                </a:solidFill>
+                <a:effectLst/>
+                <a:latin typeface="Consolas" panose="020B0609020204030204" pitchFamily="49" charset="0"/>
+              </a:rPr>
+              <a:t>)/</a:t>
+            </a:r>
+            <a:r>
+              <a:rPr lang="en-GB" sz="800" b="0" dirty="0" err="1">
+                <a:solidFill>
+                  <a:srgbClr val="8B0000"/>
+                </a:solidFill>
+                <a:effectLst/>
+                <a:latin typeface="Consolas" panose="020B0609020204030204" pitchFamily="49" charset="0"/>
+              </a:rPr>
+              <a:t>src</a:t>
+            </a:r>
+            <a:r>
+              <a:rPr lang="en-GB" sz="800" b="0" dirty="0">
+                <a:solidFill>
+                  <a:srgbClr val="8B0000"/>
+                </a:solidFill>
+                <a:effectLst/>
+                <a:latin typeface="Consolas" panose="020B0609020204030204" pitchFamily="49" charset="0"/>
+              </a:rPr>
+              <a:t>-python/</a:t>
+            </a:r>
+            <a:r>
+              <a:rPr lang="en-GB" sz="800" b="0" dirty="0">
+                <a:solidFill>
+                  <a:srgbClr val="333333"/>
+                </a:solidFill>
+                <a:effectLst/>
+                <a:latin typeface="Consolas" panose="020B0609020204030204" pitchFamily="49" charset="0"/>
+              </a:rPr>
+              <a:t>  </a:t>
+            </a:r>
+          </a:p>
+          <a:p>
+            <a:r>
+              <a:rPr lang="en-GB" sz="800" b="0" dirty="0">
+                <a:solidFill>
+                  <a:srgbClr val="333333"/>
+                </a:solidFill>
+                <a:effectLst/>
+                <a:latin typeface="Consolas" panose="020B0609020204030204" pitchFamily="49" charset="0"/>
+              </a:rPr>
+              <a:t>    </a:t>
+            </a:r>
+            <a:r>
+              <a:rPr lang="en-GB" sz="800" b="0" dirty="0">
+                <a:solidFill>
+                  <a:srgbClr val="8B0000"/>
+                </a:solidFill>
+                <a:effectLst/>
+                <a:latin typeface="Consolas" panose="020B0609020204030204" pitchFamily="49" charset="0"/>
+              </a:rPr>
+              <a:t>artifact</a:t>
+            </a:r>
+            <a:r>
+              <a:rPr lang="en-GB" sz="800" b="0" dirty="0">
+                <a:solidFill>
+                  <a:srgbClr val="000000"/>
+                </a:solidFill>
+                <a:effectLst/>
+                <a:latin typeface="Consolas" panose="020B0609020204030204" pitchFamily="49" charset="0"/>
+              </a:rPr>
+              <a:t>:</a:t>
+            </a:r>
+            <a:r>
+              <a:rPr lang="en-GB" sz="800" b="0" dirty="0">
+                <a:solidFill>
+                  <a:srgbClr val="333333"/>
+                </a:solidFill>
+                <a:effectLst/>
+                <a:latin typeface="Consolas" panose="020B0609020204030204" pitchFamily="49" charset="0"/>
+              </a:rPr>
+              <a:t> </a:t>
+            </a:r>
+            <a:r>
+              <a:rPr lang="en-GB" sz="800" b="0" dirty="0">
+                <a:solidFill>
+                  <a:srgbClr val="000000"/>
+                </a:solidFill>
+                <a:effectLst/>
+                <a:latin typeface="Consolas" panose="020B0609020204030204" pitchFamily="49" charset="0"/>
+              </a:rPr>
+              <a:t>'</a:t>
+            </a:r>
+            <a:r>
+              <a:rPr lang="en-GB" sz="800" b="0" dirty="0" err="1">
+                <a:solidFill>
+                  <a:srgbClr val="8B0000"/>
+                </a:solidFill>
+                <a:effectLst/>
+                <a:latin typeface="Consolas" panose="020B0609020204030204" pitchFamily="49" charset="0"/>
+              </a:rPr>
+              <a:t>pythonsource</a:t>
+            </a:r>
+            <a:r>
+              <a:rPr lang="en-GB" sz="800" b="0" dirty="0">
+                <a:solidFill>
+                  <a:srgbClr val="000000"/>
+                </a:solidFill>
+                <a:effectLst/>
+                <a:latin typeface="Consolas" panose="020B0609020204030204" pitchFamily="49" charset="0"/>
+              </a:rPr>
+              <a:t>'</a:t>
+            </a:r>
+            <a:endParaRPr lang="en-GB" sz="800" b="0" dirty="0">
+              <a:solidFill>
+                <a:srgbClr val="333333"/>
+              </a:solidFill>
+              <a:effectLst/>
+              <a:latin typeface="Consolas" panose="020B0609020204030204" pitchFamily="49" charset="0"/>
+            </a:endParaRPr>
+          </a:p>
+          <a:p>
+            <a:br>
+              <a:rPr lang="en-GB" sz="800" b="0" dirty="0">
+                <a:solidFill>
+                  <a:srgbClr val="333333"/>
+                </a:solidFill>
+                <a:effectLst/>
+                <a:latin typeface="Consolas" panose="020B0609020204030204" pitchFamily="49" charset="0"/>
+              </a:rPr>
+            </a:br>
+            <a:endParaRPr lang="en-GB" sz="800" b="0" dirty="0">
+              <a:solidFill>
+                <a:srgbClr val="333333"/>
+              </a:solidFill>
+              <a:effectLst/>
+              <a:latin typeface="Consolas" panose="020B0609020204030204" pitchFamily="49" charset="0"/>
+            </a:endParaRPr>
+          </a:p>
+          <a:p>
+            <a:endParaRPr lang="en-GB" sz="800" dirty="0"/>
+          </a:p>
+        </p:txBody>
+      </p:sp>
     </p:spTree>
     <p:extLst>
       <p:ext uri="{BB962C8B-B14F-4D97-AF65-F5344CB8AC3E}">

</xml_diff>

<commit_message>
Feature/cicd step 600 python docker (#34)
* Got AP Scheduler to work

* added second job and display all jobs

* Got python to work in Docker

* added structure of Python

* Docker steps

* docker build

* removed Dockerfile

* notes - python dir structure explanation

* Nearly completed Python docs

* picture of how artifacts work, solution folder view

* what to expect

* decorated pre with yml

* transferred to readme
</commit_message>
<xml_diff>
--- a/ci-cd-stages-demo/docs/cicd.pptx
+++ b/ci-cd-stages-demo/docs/cicd.pptx
@@ -9,6 +9,7 @@
     <p:sldId id="257" r:id="rId3"/>
     <p:sldId id="258" r:id="rId4"/>
     <p:sldId id="259" r:id="rId5"/>
+    <p:sldId id="260" r:id="rId6"/>
   </p:sldIdLst>
   <p:sldSz cx="12192000" cy="6858000"/>
   <p:notesSz cx="6858000" cy="9144000"/>
@@ -264,7 +265,7 @@
           <a:p>
             <a:fld id="{07BEF4AF-FE93-48EE-A03F-18E680F520CD}" type="datetimeFigureOut">
               <a:rPr lang="en-GB" smtClean="0"/>
-              <a:t>11/08/2023</a:t>
+              <a:t>21/08/2023</a:t>
             </a:fld>
             <a:endParaRPr lang="en-GB"/>
           </a:p>
@@ -464,7 +465,7 @@
           <a:p>
             <a:fld id="{07BEF4AF-FE93-48EE-A03F-18E680F520CD}" type="datetimeFigureOut">
               <a:rPr lang="en-GB" smtClean="0"/>
-              <a:t>11/08/2023</a:t>
+              <a:t>21/08/2023</a:t>
             </a:fld>
             <a:endParaRPr lang="en-GB"/>
           </a:p>
@@ -674,7 +675,7 @@
           <a:p>
             <a:fld id="{07BEF4AF-FE93-48EE-A03F-18E680F520CD}" type="datetimeFigureOut">
               <a:rPr lang="en-GB" smtClean="0"/>
-              <a:t>11/08/2023</a:t>
+              <a:t>21/08/2023</a:t>
             </a:fld>
             <a:endParaRPr lang="en-GB"/>
           </a:p>
@@ -874,7 +875,7 @@
           <a:p>
             <a:fld id="{07BEF4AF-FE93-48EE-A03F-18E680F520CD}" type="datetimeFigureOut">
               <a:rPr lang="en-GB" smtClean="0"/>
-              <a:t>11/08/2023</a:t>
+              <a:t>21/08/2023</a:t>
             </a:fld>
             <a:endParaRPr lang="en-GB"/>
           </a:p>
@@ -1150,7 +1151,7 @@
           <a:p>
             <a:fld id="{07BEF4AF-FE93-48EE-A03F-18E680F520CD}" type="datetimeFigureOut">
               <a:rPr lang="en-GB" smtClean="0"/>
-              <a:t>11/08/2023</a:t>
+              <a:t>21/08/2023</a:t>
             </a:fld>
             <a:endParaRPr lang="en-GB"/>
           </a:p>
@@ -1418,7 +1419,7 @@
           <a:p>
             <a:fld id="{07BEF4AF-FE93-48EE-A03F-18E680F520CD}" type="datetimeFigureOut">
               <a:rPr lang="en-GB" smtClean="0"/>
-              <a:t>11/08/2023</a:t>
+              <a:t>21/08/2023</a:t>
             </a:fld>
             <a:endParaRPr lang="en-GB"/>
           </a:p>
@@ -1833,7 +1834,7 @@
           <a:p>
             <a:fld id="{07BEF4AF-FE93-48EE-A03F-18E680F520CD}" type="datetimeFigureOut">
               <a:rPr lang="en-GB" smtClean="0"/>
-              <a:t>11/08/2023</a:t>
+              <a:t>21/08/2023</a:t>
             </a:fld>
             <a:endParaRPr lang="en-GB"/>
           </a:p>
@@ -1975,7 +1976,7 @@
           <a:p>
             <a:fld id="{07BEF4AF-FE93-48EE-A03F-18E680F520CD}" type="datetimeFigureOut">
               <a:rPr lang="en-GB" smtClean="0"/>
-              <a:t>11/08/2023</a:t>
+              <a:t>21/08/2023</a:t>
             </a:fld>
             <a:endParaRPr lang="en-GB"/>
           </a:p>
@@ -2088,7 +2089,7 @@
           <a:p>
             <a:fld id="{07BEF4AF-FE93-48EE-A03F-18E680F520CD}" type="datetimeFigureOut">
               <a:rPr lang="en-GB" smtClean="0"/>
-              <a:t>11/08/2023</a:t>
+              <a:t>21/08/2023</a:t>
             </a:fld>
             <a:endParaRPr lang="en-GB"/>
           </a:p>
@@ -2401,7 +2402,7 @@
           <a:p>
             <a:fld id="{07BEF4AF-FE93-48EE-A03F-18E680F520CD}" type="datetimeFigureOut">
               <a:rPr lang="en-GB" smtClean="0"/>
-              <a:t>11/08/2023</a:t>
+              <a:t>21/08/2023</a:t>
             </a:fld>
             <a:endParaRPr lang="en-GB"/>
           </a:p>
@@ -2690,7 +2691,7 @@
           <a:p>
             <a:fld id="{07BEF4AF-FE93-48EE-A03F-18E680F520CD}" type="datetimeFigureOut">
               <a:rPr lang="en-GB" smtClean="0"/>
-              <a:t>11/08/2023</a:t>
+              <a:t>21/08/2023</a:t>
             </a:fld>
             <a:endParaRPr lang="en-GB"/>
           </a:p>
@@ -2933,7 +2934,7 @@
           <a:p>
             <a:fld id="{07BEF4AF-FE93-48EE-A03F-18E680F520CD}" type="datetimeFigureOut">
               <a:rPr lang="en-GB" smtClean="0"/>
-              <a:t>11/08/2023</a:t>
+              <a:t>21/08/2023</a:t>
             </a:fld>
             <a:endParaRPr lang="en-GB"/>
           </a:p>
@@ -3936,10 +3937,10 @@
       </p:grpSpPr>
       <p:pic>
         <p:nvPicPr>
-          <p:cNvPr id="3" name="Picture 2">
-            <a:extLst>
-              <a:ext uri="{FF2B5EF4-FFF2-40B4-BE49-F238E27FC236}">
-                <a16:creationId xmlns:a16="http://schemas.microsoft.com/office/drawing/2014/main" id="{AF0CCB1E-1626-4F7A-8221-5D082799511D}"/>
+          <p:cNvPr id="5" name="Picture 4">
+            <a:extLst>
+              <a:ext uri="{FF2B5EF4-FFF2-40B4-BE49-F238E27FC236}">
+                <a16:creationId xmlns:a16="http://schemas.microsoft.com/office/drawing/2014/main" id="{92B0A4FA-4E89-0B40-AACC-51F009767C36}"/>
               </a:ext>
             </a:extLst>
           </p:cNvPr>
@@ -3956,8 +3957,8 @@
         </p:blipFill>
         <p:spPr>
           <a:xfrm>
-            <a:off x="980463" y="1063933"/>
-            <a:ext cx="8991600" cy="1781175"/>
+            <a:off x="1620915" y="3429000"/>
+            <a:ext cx="10287000" cy="3152775"/>
           </a:xfrm>
           <a:prstGeom prst="rect">
             <a:avLst/>
@@ -3971,10 +3972,10 @@
       </p:pic>
       <p:pic>
         <p:nvPicPr>
-          <p:cNvPr id="5" name="Picture 4">
-            <a:extLst>
-              <a:ext uri="{FF2B5EF4-FFF2-40B4-BE49-F238E27FC236}">
-                <a16:creationId xmlns:a16="http://schemas.microsoft.com/office/drawing/2014/main" id="{92B0A4FA-4E89-0B40-AACC-51F009767C36}"/>
+          <p:cNvPr id="3" name="Picture 2">
+            <a:extLst>
+              <a:ext uri="{FF2B5EF4-FFF2-40B4-BE49-F238E27FC236}">
+                <a16:creationId xmlns:a16="http://schemas.microsoft.com/office/drawing/2014/main" id="{AF0CCB1E-1626-4F7A-8221-5D082799511D}"/>
               </a:ext>
             </a:extLst>
           </p:cNvPr>
@@ -3991,8 +3992,8 @@
         </p:blipFill>
         <p:spPr>
           <a:xfrm>
-            <a:off x="1620915" y="3429000"/>
-            <a:ext cx="10287000" cy="3152775"/>
+            <a:off x="980463" y="1063933"/>
+            <a:ext cx="8991600" cy="1781175"/>
           </a:xfrm>
           <a:prstGeom prst="rect">
             <a:avLst/>
@@ -4157,6 +4158,1097 @@
     <p:extLst>
       <p:ext uri="{BB962C8B-B14F-4D97-AF65-F5344CB8AC3E}">
         <p14:creationId xmlns:p14="http://schemas.microsoft.com/office/powerpoint/2010/main" val="3118764611"/>
+      </p:ext>
+    </p:extLst>
+  </p:cSld>
+  <p:clrMapOvr>
+    <a:masterClrMapping/>
+  </p:clrMapOvr>
+</p:sld>
+</file>
+
+<file path=ppt/slides/slide5.xml><?xml version="1.0" encoding="utf-8"?>
+<p:sld xmlns:a="http://schemas.openxmlformats.org/drawingml/2006/main" xmlns:r="http://schemas.openxmlformats.org/officeDocument/2006/relationships" xmlns:p="http://schemas.openxmlformats.org/presentationml/2006/main">
+  <p:cSld>
+    <p:spTree>
+      <p:nvGrpSpPr>
+        <p:cNvPr id="1" name=""/>
+        <p:cNvGrpSpPr/>
+        <p:nvPr/>
+      </p:nvGrpSpPr>
+      <p:grpSpPr>
+        <a:xfrm>
+          <a:off x="0" y="0"/>
+          <a:ext cx="0" cy="0"/>
+          <a:chOff x="0" y="0"/>
+          <a:chExt cx="0" cy="0"/>
+        </a:xfrm>
+      </p:grpSpPr>
+      <p:pic>
+        <p:nvPicPr>
+          <p:cNvPr id="5" name="Picture 4">
+            <a:extLst>
+              <a:ext uri="{FF2B5EF4-FFF2-40B4-BE49-F238E27FC236}">
+                <a16:creationId xmlns:a16="http://schemas.microsoft.com/office/drawing/2014/main" id="{9C346CC8-6CAF-5353-5813-174FFE0F253C}"/>
+              </a:ext>
+            </a:extLst>
+          </p:cNvPr>
+          <p:cNvPicPr>
+            <a:picLocks noChangeAspect="1"/>
+          </p:cNvPicPr>
+          <p:nvPr/>
+        </p:nvPicPr>
+        <p:blipFill>
+          <a:blip r:embed="rId2"/>
+          <a:stretch>
+            <a:fillRect/>
+          </a:stretch>
+        </p:blipFill>
+        <p:spPr>
+          <a:xfrm>
+            <a:off x="747842" y="497145"/>
+            <a:ext cx="9897409" cy="1865281"/>
+          </a:xfrm>
+          <a:prstGeom prst="rect">
+            <a:avLst/>
+          </a:prstGeom>
+        </p:spPr>
+      </p:pic>
+      <p:cxnSp>
+        <p:nvCxnSpPr>
+          <p:cNvPr id="4" name="Straight Arrow Connector 3">
+            <a:extLst>
+              <a:ext uri="{FF2B5EF4-FFF2-40B4-BE49-F238E27FC236}">
+                <a16:creationId xmlns:a16="http://schemas.microsoft.com/office/drawing/2014/main" id="{4009AAF2-9A10-A77F-8C35-6CF23ECDE41E}"/>
+              </a:ext>
+            </a:extLst>
+          </p:cNvPr>
+          <p:cNvCxnSpPr>
+            <a:cxnSpLocks/>
+          </p:cNvCxnSpPr>
+          <p:nvPr/>
+        </p:nvCxnSpPr>
+        <p:spPr>
+          <a:xfrm>
+            <a:off x="2024109" y="1970838"/>
+            <a:ext cx="1423960" cy="2193048"/>
+          </a:xfrm>
+          <a:prstGeom prst="straightConnector1">
+            <a:avLst/>
+          </a:prstGeom>
+          <a:ln w="31750">
+            <a:solidFill>
+              <a:srgbClr val="FFFF00"/>
+            </a:solidFill>
+            <a:tailEnd type="triangle"/>
+          </a:ln>
+        </p:spPr>
+        <p:style>
+          <a:lnRef idx="1">
+            <a:schemeClr val="accent1"/>
+          </a:lnRef>
+          <a:fillRef idx="0">
+            <a:schemeClr val="accent1"/>
+          </a:fillRef>
+          <a:effectRef idx="0">
+            <a:schemeClr val="accent1"/>
+          </a:effectRef>
+          <a:fontRef idx="minor">
+            <a:schemeClr val="tx1"/>
+          </a:fontRef>
+        </p:style>
+      </p:cxnSp>
+      <p:sp>
+        <p:nvSpPr>
+          <p:cNvPr id="6" name="Rectangle 5">
+            <a:extLst>
+              <a:ext uri="{FF2B5EF4-FFF2-40B4-BE49-F238E27FC236}">
+                <a16:creationId xmlns:a16="http://schemas.microsoft.com/office/drawing/2014/main" id="{2427FA44-2EBC-D09D-1AB1-C0B7EAC5C0D3}"/>
+              </a:ext>
+            </a:extLst>
+          </p:cNvPr>
+          <p:cNvSpPr/>
+          <p:nvPr/>
+        </p:nvSpPr>
+        <p:spPr>
+          <a:xfrm>
+            <a:off x="1149675" y="1700081"/>
+            <a:ext cx="1220664" cy="355107"/>
+          </a:xfrm>
+          <a:prstGeom prst="rect">
+            <a:avLst/>
+          </a:prstGeom>
+          <a:noFill/>
+          <a:ln w="25400" cap="rnd">
+            <a:solidFill>
+              <a:srgbClr val="FFFF00"/>
+            </a:solidFill>
+          </a:ln>
+        </p:spPr>
+        <p:style>
+          <a:lnRef idx="2">
+            <a:schemeClr val="accent1">
+              <a:shade val="15000"/>
+            </a:schemeClr>
+          </a:lnRef>
+          <a:fillRef idx="1">
+            <a:schemeClr val="accent1"/>
+          </a:fillRef>
+          <a:effectRef idx="0">
+            <a:schemeClr val="accent1"/>
+          </a:effectRef>
+          <a:fontRef idx="minor">
+            <a:schemeClr val="lt1"/>
+          </a:fontRef>
+        </p:style>
+        <p:txBody>
+          <a:bodyPr rtlCol="0" anchor="ctr"/>
+          <a:lstStyle/>
+          <a:p>
+            <a:pPr algn="ctr"/>
+            <a:endParaRPr lang="en-GB"/>
+          </a:p>
+        </p:txBody>
+      </p:sp>
+      <p:sp>
+        <p:nvSpPr>
+          <p:cNvPr id="7" name="TextBox 6">
+            <a:extLst>
+              <a:ext uri="{FF2B5EF4-FFF2-40B4-BE49-F238E27FC236}">
+                <a16:creationId xmlns:a16="http://schemas.microsoft.com/office/drawing/2014/main" id="{712D5181-2B02-D131-065B-24D85FA12493}"/>
+              </a:ext>
+            </a:extLst>
+          </p:cNvPr>
+          <p:cNvSpPr txBox="1"/>
+          <p:nvPr/>
+        </p:nvSpPr>
+        <p:spPr>
+          <a:xfrm>
+            <a:off x="569908" y="4319244"/>
+            <a:ext cx="3611475" cy="923330"/>
+          </a:xfrm>
+          <a:prstGeom prst="rect">
+            <a:avLst/>
+          </a:prstGeom>
+          <a:noFill/>
+          <a:ln>
+            <a:solidFill>
+              <a:schemeClr val="accent1"/>
+            </a:solidFill>
+          </a:ln>
+        </p:spPr>
+        <p:txBody>
+          <a:bodyPr wrap="square" rtlCol="0">
+            <a:spAutoFit/>
+          </a:bodyPr>
+          <a:lstStyle/>
+          <a:p>
+            <a:r>
+              <a:rPr lang="en-GB" dirty="0"/>
+              <a:t>The </a:t>
+            </a:r>
+            <a:r>
+              <a:rPr lang="en-GB" b="1" dirty="0"/>
+              <a:t>Build</a:t>
+            </a:r>
+            <a:r>
+              <a:rPr lang="en-GB" dirty="0"/>
+              <a:t> stage publishes the artifact(s) using </a:t>
+            </a:r>
+            <a:r>
+              <a:rPr lang="en-GB" b="1" dirty="0" err="1"/>
+              <a:t>PublishPipelineArtifact</a:t>
+            </a:r>
+            <a:r>
+              <a:rPr lang="en-GB" dirty="0"/>
+              <a:t> task</a:t>
+            </a:r>
+          </a:p>
+        </p:txBody>
+      </p:sp>
+      <p:cxnSp>
+        <p:nvCxnSpPr>
+          <p:cNvPr id="8" name="Straight Arrow Connector 7">
+            <a:extLst>
+              <a:ext uri="{FF2B5EF4-FFF2-40B4-BE49-F238E27FC236}">
+                <a16:creationId xmlns:a16="http://schemas.microsoft.com/office/drawing/2014/main" id="{B0DFC707-AC60-F916-457A-1F2130474F41}"/>
+              </a:ext>
+            </a:extLst>
+          </p:cNvPr>
+          <p:cNvCxnSpPr>
+            <a:cxnSpLocks/>
+            <a:endCxn id="12" idx="0"/>
+          </p:cNvCxnSpPr>
+          <p:nvPr/>
+        </p:nvCxnSpPr>
+        <p:spPr>
+          <a:xfrm>
+            <a:off x="5956917" y="1544710"/>
+            <a:ext cx="1247799" cy="2774534"/>
+          </a:xfrm>
+          <a:prstGeom prst="straightConnector1">
+            <a:avLst/>
+          </a:prstGeom>
+          <a:ln w="31750">
+            <a:solidFill>
+              <a:srgbClr val="FFFF00"/>
+            </a:solidFill>
+            <a:tailEnd type="triangle"/>
+          </a:ln>
+        </p:spPr>
+        <p:style>
+          <a:lnRef idx="1">
+            <a:schemeClr val="accent1"/>
+          </a:lnRef>
+          <a:fillRef idx="0">
+            <a:schemeClr val="accent1"/>
+          </a:fillRef>
+          <a:effectRef idx="0">
+            <a:schemeClr val="accent1"/>
+          </a:effectRef>
+          <a:fontRef idx="minor">
+            <a:schemeClr val="tx1"/>
+          </a:fontRef>
+        </p:style>
+      </p:cxnSp>
+      <p:cxnSp>
+        <p:nvCxnSpPr>
+          <p:cNvPr id="10" name="Straight Arrow Connector 9">
+            <a:extLst>
+              <a:ext uri="{FF2B5EF4-FFF2-40B4-BE49-F238E27FC236}">
+                <a16:creationId xmlns:a16="http://schemas.microsoft.com/office/drawing/2014/main" id="{5952B7E9-669F-8DAD-AD00-BE1B94E4548E}"/>
+              </a:ext>
+            </a:extLst>
+          </p:cNvPr>
+          <p:cNvCxnSpPr>
+            <a:cxnSpLocks/>
+          </p:cNvCxnSpPr>
+          <p:nvPr/>
+        </p:nvCxnSpPr>
+        <p:spPr>
+          <a:xfrm flipH="1">
+            <a:off x="7501631" y="1566905"/>
+            <a:ext cx="1775343" cy="2752339"/>
+          </a:xfrm>
+          <a:prstGeom prst="straightConnector1">
+            <a:avLst/>
+          </a:prstGeom>
+          <a:ln w="31750">
+            <a:solidFill>
+              <a:srgbClr val="FFFF00"/>
+            </a:solidFill>
+            <a:tailEnd type="triangle"/>
+          </a:ln>
+        </p:spPr>
+        <p:style>
+          <a:lnRef idx="1">
+            <a:schemeClr val="accent1"/>
+          </a:lnRef>
+          <a:fillRef idx="0">
+            <a:schemeClr val="accent1"/>
+          </a:fillRef>
+          <a:effectRef idx="0">
+            <a:schemeClr val="accent1"/>
+          </a:effectRef>
+          <a:fontRef idx="minor">
+            <a:schemeClr val="tx1"/>
+          </a:fontRef>
+        </p:style>
+      </p:cxnSp>
+      <p:sp>
+        <p:nvSpPr>
+          <p:cNvPr id="12" name="TextBox 11">
+            <a:extLst>
+              <a:ext uri="{FF2B5EF4-FFF2-40B4-BE49-F238E27FC236}">
+                <a16:creationId xmlns:a16="http://schemas.microsoft.com/office/drawing/2014/main" id="{CE798734-D834-35D1-7B0D-B3952742B246}"/>
+              </a:ext>
+            </a:extLst>
+          </p:cNvPr>
+          <p:cNvSpPr txBox="1"/>
+          <p:nvPr/>
+        </p:nvSpPr>
+        <p:spPr>
+          <a:xfrm>
+            <a:off x="5398978" y="4319244"/>
+            <a:ext cx="3611475" cy="923330"/>
+          </a:xfrm>
+          <a:prstGeom prst="rect">
+            <a:avLst/>
+          </a:prstGeom>
+          <a:noFill/>
+          <a:ln>
+            <a:solidFill>
+              <a:schemeClr val="accent1"/>
+            </a:solidFill>
+          </a:ln>
+        </p:spPr>
+        <p:txBody>
+          <a:bodyPr wrap="square" rtlCol="0">
+            <a:spAutoFit/>
+          </a:bodyPr>
+          <a:lstStyle/>
+          <a:p>
+            <a:r>
+              <a:rPr lang="en-GB" dirty="0"/>
+              <a:t>The </a:t>
+            </a:r>
+            <a:r>
+              <a:rPr lang="en-GB" b="1" dirty="0"/>
+              <a:t>Deploy</a:t>
+            </a:r>
+            <a:r>
+              <a:rPr lang="en-GB" dirty="0"/>
+              <a:t> stage restores the artifact(s) from the Build stage using the </a:t>
+            </a:r>
+            <a:r>
+              <a:rPr lang="en-GB" b="1" dirty="0" err="1"/>
+              <a:t>DownloadPipelineArtifact</a:t>
+            </a:r>
+            <a:r>
+              <a:rPr lang="en-GB" dirty="0"/>
+              <a:t> task</a:t>
+            </a:r>
+          </a:p>
+        </p:txBody>
+      </p:sp>
+      <p:sp>
+        <p:nvSpPr>
+          <p:cNvPr id="17" name="TextBox 16">
+            <a:extLst>
+              <a:ext uri="{FF2B5EF4-FFF2-40B4-BE49-F238E27FC236}">
+                <a16:creationId xmlns:a16="http://schemas.microsoft.com/office/drawing/2014/main" id="{DD64918C-DC05-6F79-3DF9-8A7BD51F3E82}"/>
+              </a:ext>
+            </a:extLst>
+          </p:cNvPr>
+          <p:cNvSpPr txBox="1"/>
+          <p:nvPr/>
+        </p:nvSpPr>
+        <p:spPr>
+          <a:xfrm>
+            <a:off x="9010453" y="2839880"/>
+            <a:ext cx="2823481" cy="830997"/>
+          </a:xfrm>
+          <a:prstGeom prst="rect">
+            <a:avLst/>
+          </a:prstGeom>
+        </p:spPr>
+        <p:style>
+          <a:lnRef idx="2">
+            <a:schemeClr val="accent1"/>
+          </a:lnRef>
+          <a:fillRef idx="1">
+            <a:schemeClr val="lt1"/>
+          </a:fillRef>
+          <a:effectRef idx="0">
+            <a:schemeClr val="accent1"/>
+          </a:effectRef>
+          <a:fontRef idx="minor">
+            <a:schemeClr val="dk1"/>
+          </a:fontRef>
+        </p:style>
+        <p:txBody>
+          <a:bodyPr wrap="square" rtlCol="0">
+            <a:spAutoFit/>
+          </a:bodyPr>
+          <a:lstStyle/>
+          <a:p>
+            <a:endParaRPr lang="en-US" sz="800" b="0" dirty="0">
+              <a:solidFill>
+                <a:srgbClr val="333333"/>
+              </a:solidFill>
+              <a:effectLst/>
+              <a:latin typeface="Consolas" panose="020B0609020204030204" pitchFamily="49" charset="0"/>
+            </a:endParaRPr>
+          </a:p>
+          <a:p>
+            <a:r>
+              <a:rPr lang="en-US" sz="800" b="0" dirty="0">
+                <a:solidFill>
+                  <a:srgbClr val="000000"/>
+                </a:solidFill>
+                <a:effectLst/>
+                <a:latin typeface="Consolas" panose="020B0609020204030204" pitchFamily="49" charset="0"/>
+              </a:rPr>
+              <a:t>-</a:t>
+            </a:r>
+            <a:r>
+              <a:rPr lang="en-US" sz="800" b="0" dirty="0">
+                <a:solidFill>
+                  <a:srgbClr val="333333"/>
+                </a:solidFill>
+                <a:effectLst/>
+                <a:latin typeface="Consolas" panose="020B0609020204030204" pitchFamily="49" charset="0"/>
+              </a:rPr>
+              <a:t> </a:t>
+            </a:r>
+            <a:r>
+              <a:rPr lang="en-US" sz="800" b="0" dirty="0">
+                <a:solidFill>
+                  <a:srgbClr val="8B0000"/>
+                </a:solidFill>
+                <a:effectLst/>
+                <a:latin typeface="Consolas" panose="020B0609020204030204" pitchFamily="49" charset="0"/>
+              </a:rPr>
+              <a:t>task</a:t>
+            </a:r>
+            <a:r>
+              <a:rPr lang="en-US" sz="800" b="0" dirty="0">
+                <a:solidFill>
+                  <a:srgbClr val="000000"/>
+                </a:solidFill>
+                <a:effectLst/>
+                <a:latin typeface="Consolas" panose="020B0609020204030204" pitchFamily="49" charset="0"/>
+              </a:rPr>
+              <a:t>:</a:t>
+            </a:r>
+            <a:r>
+              <a:rPr lang="en-US" sz="800" b="0" dirty="0">
+                <a:solidFill>
+                  <a:srgbClr val="333333"/>
+                </a:solidFill>
+                <a:effectLst/>
+                <a:latin typeface="Consolas" panose="020B0609020204030204" pitchFamily="49" charset="0"/>
+              </a:rPr>
+              <a:t> </a:t>
+            </a:r>
+            <a:r>
+              <a:rPr lang="en-US" sz="800" b="1" dirty="0">
+                <a:solidFill>
+                  <a:srgbClr val="8B0000"/>
+                </a:solidFill>
+                <a:effectLst/>
+                <a:latin typeface="Consolas" panose="020B0609020204030204" pitchFamily="49" charset="0"/>
+              </a:rPr>
+              <a:t>DownloadPipelineArtifact</a:t>
+            </a:r>
+            <a:r>
+              <a:rPr lang="en-US" sz="800" b="0" dirty="0">
+                <a:solidFill>
+                  <a:srgbClr val="8B0000"/>
+                </a:solidFill>
+                <a:effectLst/>
+                <a:latin typeface="Consolas" panose="020B0609020204030204" pitchFamily="49" charset="0"/>
+              </a:rPr>
+              <a:t>@2</a:t>
+            </a:r>
+            <a:endParaRPr lang="en-US" sz="800" b="0" dirty="0">
+              <a:solidFill>
+                <a:srgbClr val="333333"/>
+              </a:solidFill>
+              <a:effectLst/>
+              <a:latin typeface="Consolas" panose="020B0609020204030204" pitchFamily="49" charset="0"/>
+            </a:endParaRPr>
+          </a:p>
+          <a:p>
+            <a:r>
+              <a:rPr lang="en-US" sz="800" b="0" dirty="0">
+                <a:solidFill>
+                  <a:srgbClr val="333333"/>
+                </a:solidFill>
+                <a:effectLst/>
+                <a:latin typeface="Consolas" panose="020B0609020204030204" pitchFamily="49" charset="0"/>
+              </a:rPr>
+              <a:t>  </a:t>
+            </a:r>
+            <a:r>
+              <a:rPr lang="en-US" sz="800" b="0" dirty="0">
+                <a:solidFill>
+                  <a:srgbClr val="8B0000"/>
+                </a:solidFill>
+                <a:effectLst/>
+                <a:latin typeface="Consolas" panose="020B0609020204030204" pitchFamily="49" charset="0"/>
+              </a:rPr>
+              <a:t>inputs</a:t>
+            </a:r>
+            <a:r>
+              <a:rPr lang="en-US" sz="800" b="0" dirty="0">
+                <a:solidFill>
+                  <a:srgbClr val="000000"/>
+                </a:solidFill>
+                <a:effectLst/>
+                <a:latin typeface="Consolas" panose="020B0609020204030204" pitchFamily="49" charset="0"/>
+              </a:rPr>
+              <a:t>:</a:t>
+            </a:r>
+            <a:endParaRPr lang="en-US" sz="800" b="0" dirty="0">
+              <a:solidFill>
+                <a:srgbClr val="333333"/>
+              </a:solidFill>
+              <a:effectLst/>
+              <a:latin typeface="Consolas" panose="020B0609020204030204" pitchFamily="49" charset="0"/>
+            </a:endParaRPr>
+          </a:p>
+          <a:p>
+            <a:r>
+              <a:rPr lang="en-US" sz="800" b="0" dirty="0">
+                <a:solidFill>
+                  <a:srgbClr val="333333"/>
+                </a:solidFill>
+                <a:effectLst/>
+                <a:latin typeface="Consolas" panose="020B0609020204030204" pitchFamily="49" charset="0"/>
+              </a:rPr>
+              <a:t>    </a:t>
+            </a:r>
+            <a:r>
+              <a:rPr lang="en-US" sz="800" b="0" dirty="0">
+                <a:solidFill>
+                  <a:srgbClr val="8B0000"/>
+                </a:solidFill>
+                <a:effectLst/>
+                <a:latin typeface="Consolas" panose="020B0609020204030204" pitchFamily="49" charset="0"/>
+              </a:rPr>
+              <a:t>artifact</a:t>
+            </a:r>
+            <a:r>
+              <a:rPr lang="en-US" sz="800" b="0" dirty="0">
+                <a:solidFill>
+                  <a:srgbClr val="000000"/>
+                </a:solidFill>
+                <a:effectLst/>
+                <a:latin typeface="Consolas" panose="020B0609020204030204" pitchFamily="49" charset="0"/>
+              </a:rPr>
+              <a:t>:</a:t>
+            </a:r>
+            <a:r>
+              <a:rPr lang="en-US" sz="800" b="0" dirty="0">
+                <a:solidFill>
+                  <a:srgbClr val="333333"/>
+                </a:solidFill>
+                <a:effectLst/>
+                <a:latin typeface="Consolas" panose="020B0609020204030204" pitchFamily="49" charset="0"/>
+              </a:rPr>
+              <a:t> </a:t>
+            </a:r>
+          </a:p>
+          <a:p>
+            <a:r>
+              <a:rPr lang="en-US" sz="800" b="0" dirty="0">
+                <a:solidFill>
+                  <a:srgbClr val="333333"/>
+                </a:solidFill>
+                <a:effectLst/>
+                <a:latin typeface="Consolas" panose="020B0609020204030204" pitchFamily="49" charset="0"/>
+              </a:rPr>
+              <a:t>    </a:t>
+            </a:r>
+            <a:r>
+              <a:rPr lang="en-US" sz="800" b="0" dirty="0">
+                <a:solidFill>
+                  <a:srgbClr val="8B0000"/>
+                </a:solidFill>
+                <a:effectLst/>
+                <a:latin typeface="Consolas" panose="020B0609020204030204" pitchFamily="49" charset="0"/>
+              </a:rPr>
+              <a:t>path</a:t>
+            </a:r>
+            <a:r>
+              <a:rPr lang="en-US" sz="800" b="0" dirty="0">
+                <a:solidFill>
+                  <a:srgbClr val="000000"/>
+                </a:solidFill>
+                <a:effectLst/>
+                <a:latin typeface="Consolas" panose="020B0609020204030204" pitchFamily="49" charset="0"/>
+              </a:rPr>
+              <a:t>:</a:t>
+            </a:r>
+            <a:r>
+              <a:rPr lang="en-US" sz="800" b="0" dirty="0">
+                <a:solidFill>
+                  <a:srgbClr val="333333"/>
+                </a:solidFill>
+                <a:effectLst/>
+                <a:latin typeface="Consolas" panose="020B0609020204030204" pitchFamily="49" charset="0"/>
+              </a:rPr>
+              <a:t> </a:t>
+            </a:r>
+            <a:r>
+              <a:rPr lang="en-US" sz="800" b="0" dirty="0">
+                <a:solidFill>
+                  <a:srgbClr val="8B0000"/>
+                </a:solidFill>
+                <a:effectLst/>
+                <a:latin typeface="Consolas" panose="020B0609020204030204" pitchFamily="49" charset="0"/>
+              </a:rPr>
+              <a:t>$(</a:t>
+            </a:r>
+            <a:r>
+              <a:rPr lang="en-US" sz="800" b="0" dirty="0" err="1">
+                <a:solidFill>
+                  <a:srgbClr val="8B0000"/>
+                </a:solidFill>
+                <a:effectLst/>
+                <a:latin typeface="Consolas" panose="020B0609020204030204" pitchFamily="49" charset="0"/>
+              </a:rPr>
+              <a:t>Build.Workspace</a:t>
+            </a:r>
+            <a:r>
+              <a:rPr lang="en-US" sz="800" b="0" dirty="0">
+                <a:solidFill>
+                  <a:srgbClr val="8B0000"/>
+                </a:solidFill>
+                <a:effectLst/>
+                <a:latin typeface="Consolas" panose="020B0609020204030204" pitchFamily="49" charset="0"/>
+              </a:rPr>
+              <a:t>)/demo/artifacts</a:t>
+            </a:r>
+            <a:endParaRPr lang="en-US" sz="800" b="0" dirty="0">
+              <a:solidFill>
+                <a:srgbClr val="333333"/>
+              </a:solidFill>
+              <a:effectLst/>
+              <a:latin typeface="Consolas" panose="020B0609020204030204" pitchFamily="49" charset="0"/>
+            </a:endParaRPr>
+          </a:p>
+          <a:p>
+            <a:endParaRPr lang="en-GB" sz="800" dirty="0"/>
+          </a:p>
+        </p:txBody>
+      </p:sp>
+      <p:sp>
+        <p:nvSpPr>
+          <p:cNvPr id="18" name="TextBox 17">
+            <a:extLst>
+              <a:ext uri="{FF2B5EF4-FFF2-40B4-BE49-F238E27FC236}">
+                <a16:creationId xmlns:a16="http://schemas.microsoft.com/office/drawing/2014/main" id="{F3B2BEE2-3CA9-C772-31B2-D334020B397B}"/>
+              </a:ext>
+            </a:extLst>
+          </p:cNvPr>
+          <p:cNvSpPr txBox="1"/>
+          <p:nvPr/>
+        </p:nvSpPr>
+        <p:spPr>
+          <a:xfrm>
+            <a:off x="315454" y="2839880"/>
+            <a:ext cx="3253370" cy="1077218"/>
+          </a:xfrm>
+          <a:prstGeom prst="rect">
+            <a:avLst/>
+          </a:prstGeom>
+        </p:spPr>
+        <p:style>
+          <a:lnRef idx="2">
+            <a:schemeClr val="accent1"/>
+          </a:lnRef>
+          <a:fillRef idx="1">
+            <a:schemeClr val="lt1"/>
+          </a:fillRef>
+          <a:effectRef idx="0">
+            <a:schemeClr val="accent1"/>
+          </a:effectRef>
+          <a:fontRef idx="minor">
+            <a:schemeClr val="dk1"/>
+          </a:fontRef>
+        </p:style>
+        <p:txBody>
+          <a:bodyPr wrap="square" rtlCol="0">
+            <a:spAutoFit/>
+          </a:bodyPr>
+          <a:lstStyle/>
+          <a:p>
+            <a:r>
+              <a:rPr lang="en-GB" sz="800" b="0" dirty="0">
+                <a:solidFill>
+                  <a:srgbClr val="000000"/>
+                </a:solidFill>
+                <a:effectLst/>
+                <a:latin typeface="Consolas" panose="020B0609020204030204" pitchFamily="49" charset="0"/>
+              </a:rPr>
+              <a:t>-</a:t>
+            </a:r>
+            <a:r>
+              <a:rPr lang="en-GB" sz="800" b="0" dirty="0">
+                <a:solidFill>
+                  <a:srgbClr val="333333"/>
+                </a:solidFill>
+                <a:effectLst/>
+                <a:latin typeface="Consolas" panose="020B0609020204030204" pitchFamily="49" charset="0"/>
+              </a:rPr>
+              <a:t> </a:t>
+            </a:r>
+            <a:r>
+              <a:rPr lang="en-GB" sz="800" b="0" dirty="0">
+                <a:solidFill>
+                  <a:srgbClr val="8B0000"/>
+                </a:solidFill>
+                <a:effectLst/>
+                <a:latin typeface="Consolas" panose="020B0609020204030204" pitchFamily="49" charset="0"/>
+              </a:rPr>
+              <a:t>task</a:t>
+            </a:r>
+            <a:r>
+              <a:rPr lang="en-GB" sz="800" b="0" dirty="0">
+                <a:solidFill>
+                  <a:srgbClr val="000000"/>
+                </a:solidFill>
+                <a:effectLst/>
+                <a:latin typeface="Consolas" panose="020B0609020204030204" pitchFamily="49" charset="0"/>
+              </a:rPr>
+              <a:t>:</a:t>
+            </a:r>
+            <a:r>
+              <a:rPr lang="en-GB" sz="800" b="0" dirty="0">
+                <a:solidFill>
+                  <a:srgbClr val="333333"/>
+                </a:solidFill>
+                <a:effectLst/>
+                <a:latin typeface="Consolas" panose="020B0609020204030204" pitchFamily="49" charset="0"/>
+              </a:rPr>
+              <a:t> </a:t>
+            </a:r>
+            <a:r>
+              <a:rPr lang="en-GB" sz="800" b="1" dirty="0">
+                <a:solidFill>
+                  <a:srgbClr val="8B0000"/>
+                </a:solidFill>
+                <a:effectLst/>
+                <a:latin typeface="Consolas" panose="020B0609020204030204" pitchFamily="49" charset="0"/>
+              </a:rPr>
+              <a:t>PublishPipelineArtifact</a:t>
+            </a:r>
+            <a:r>
+              <a:rPr lang="en-GB" sz="800" b="0" dirty="0">
+                <a:solidFill>
+                  <a:srgbClr val="8B0000"/>
+                </a:solidFill>
+                <a:effectLst/>
+                <a:latin typeface="Consolas" panose="020B0609020204030204" pitchFamily="49" charset="0"/>
+              </a:rPr>
+              <a:t>@1</a:t>
+            </a:r>
+            <a:endParaRPr lang="en-GB" sz="800" b="0" dirty="0">
+              <a:solidFill>
+                <a:srgbClr val="333333"/>
+              </a:solidFill>
+              <a:effectLst/>
+              <a:latin typeface="Consolas" panose="020B0609020204030204" pitchFamily="49" charset="0"/>
+            </a:endParaRPr>
+          </a:p>
+          <a:p>
+            <a:r>
+              <a:rPr lang="en-GB" sz="800" b="0" dirty="0">
+                <a:solidFill>
+                  <a:srgbClr val="333333"/>
+                </a:solidFill>
+                <a:effectLst/>
+                <a:latin typeface="Consolas" panose="020B0609020204030204" pitchFamily="49" charset="0"/>
+              </a:rPr>
+              <a:t>  </a:t>
+            </a:r>
+            <a:r>
+              <a:rPr lang="en-GB" sz="800" b="0" dirty="0" err="1">
+                <a:solidFill>
+                  <a:srgbClr val="8B0000"/>
+                </a:solidFill>
+                <a:effectLst/>
+                <a:latin typeface="Consolas" panose="020B0609020204030204" pitchFamily="49" charset="0"/>
+              </a:rPr>
+              <a:t>displayName</a:t>
+            </a:r>
+            <a:r>
+              <a:rPr lang="en-GB" sz="800" b="0" dirty="0">
+                <a:solidFill>
+                  <a:srgbClr val="000000"/>
+                </a:solidFill>
+                <a:effectLst/>
+                <a:latin typeface="Consolas" panose="020B0609020204030204" pitchFamily="49" charset="0"/>
+              </a:rPr>
+              <a:t>:</a:t>
+            </a:r>
+            <a:r>
+              <a:rPr lang="en-GB" sz="800" b="0" dirty="0">
+                <a:solidFill>
+                  <a:srgbClr val="333333"/>
+                </a:solidFill>
+                <a:effectLst/>
+                <a:latin typeface="Consolas" panose="020B0609020204030204" pitchFamily="49" charset="0"/>
+              </a:rPr>
+              <a:t> </a:t>
+            </a:r>
+            <a:r>
+              <a:rPr lang="en-GB" sz="800" b="0" dirty="0">
+                <a:solidFill>
+                  <a:srgbClr val="000000"/>
+                </a:solidFill>
+                <a:effectLst/>
+                <a:latin typeface="Consolas" panose="020B0609020204030204" pitchFamily="49" charset="0"/>
+              </a:rPr>
+              <a:t>'</a:t>
+            </a:r>
+            <a:r>
+              <a:rPr lang="en-GB" sz="800" b="0" dirty="0">
+                <a:solidFill>
+                  <a:srgbClr val="8B0000"/>
+                </a:solidFill>
+                <a:effectLst/>
+                <a:latin typeface="Consolas" panose="020B0609020204030204" pitchFamily="49" charset="0"/>
+              </a:rPr>
+              <a:t>Publish Python source folder</a:t>
+            </a:r>
+            <a:r>
+              <a:rPr lang="en-GB" sz="800" b="0" dirty="0">
+                <a:solidFill>
+                  <a:srgbClr val="000000"/>
+                </a:solidFill>
+                <a:effectLst/>
+                <a:latin typeface="Consolas" panose="020B0609020204030204" pitchFamily="49" charset="0"/>
+              </a:rPr>
+              <a:t>'</a:t>
+            </a:r>
+            <a:endParaRPr lang="en-GB" sz="800" b="0" dirty="0">
+              <a:solidFill>
+                <a:srgbClr val="333333"/>
+              </a:solidFill>
+              <a:effectLst/>
+              <a:latin typeface="Consolas" panose="020B0609020204030204" pitchFamily="49" charset="0"/>
+            </a:endParaRPr>
+          </a:p>
+          <a:p>
+            <a:r>
+              <a:rPr lang="en-GB" sz="800" b="0" dirty="0">
+                <a:solidFill>
+                  <a:srgbClr val="333333"/>
+                </a:solidFill>
+                <a:effectLst/>
+                <a:latin typeface="Consolas" panose="020B0609020204030204" pitchFamily="49" charset="0"/>
+              </a:rPr>
+              <a:t>  </a:t>
+            </a:r>
+            <a:r>
+              <a:rPr lang="en-GB" sz="800" b="0" dirty="0">
+                <a:solidFill>
+                  <a:srgbClr val="8B0000"/>
+                </a:solidFill>
+                <a:effectLst/>
+                <a:latin typeface="Consolas" panose="020B0609020204030204" pitchFamily="49" charset="0"/>
+              </a:rPr>
+              <a:t>inputs</a:t>
+            </a:r>
+            <a:r>
+              <a:rPr lang="en-GB" sz="800" b="0" dirty="0">
+                <a:solidFill>
+                  <a:srgbClr val="000000"/>
+                </a:solidFill>
+                <a:effectLst/>
+                <a:latin typeface="Consolas" panose="020B0609020204030204" pitchFamily="49" charset="0"/>
+              </a:rPr>
+              <a:t>:</a:t>
+            </a:r>
+            <a:endParaRPr lang="en-GB" sz="800" b="0" dirty="0">
+              <a:solidFill>
+                <a:srgbClr val="333333"/>
+              </a:solidFill>
+              <a:effectLst/>
+              <a:latin typeface="Consolas" panose="020B0609020204030204" pitchFamily="49" charset="0"/>
+            </a:endParaRPr>
+          </a:p>
+          <a:p>
+            <a:r>
+              <a:rPr lang="en-GB" sz="800" b="0" dirty="0">
+                <a:solidFill>
+                  <a:srgbClr val="333333"/>
+                </a:solidFill>
+                <a:effectLst/>
+                <a:latin typeface="Consolas" panose="020B0609020204030204" pitchFamily="49" charset="0"/>
+              </a:rPr>
+              <a:t>    </a:t>
+            </a:r>
+            <a:r>
+              <a:rPr lang="en-GB" sz="800" b="0" dirty="0" err="1">
+                <a:solidFill>
+                  <a:srgbClr val="8B0000"/>
+                </a:solidFill>
+                <a:effectLst/>
+                <a:latin typeface="Consolas" panose="020B0609020204030204" pitchFamily="49" charset="0"/>
+              </a:rPr>
+              <a:t>targetPath</a:t>
+            </a:r>
+            <a:r>
+              <a:rPr lang="en-GB" sz="800" b="0" dirty="0">
+                <a:solidFill>
+                  <a:srgbClr val="000000"/>
+                </a:solidFill>
+                <a:effectLst/>
+                <a:latin typeface="Consolas" panose="020B0609020204030204" pitchFamily="49" charset="0"/>
+              </a:rPr>
+              <a:t>:</a:t>
+            </a:r>
+            <a:r>
+              <a:rPr lang="en-GB" sz="800" b="0" dirty="0">
+                <a:solidFill>
+                  <a:srgbClr val="333333"/>
+                </a:solidFill>
+                <a:effectLst/>
+                <a:latin typeface="Consolas" panose="020B0609020204030204" pitchFamily="49" charset="0"/>
+              </a:rPr>
+              <a:t> </a:t>
+            </a:r>
+            <a:r>
+              <a:rPr lang="en-GB" sz="800" b="0" dirty="0">
+                <a:solidFill>
+                  <a:srgbClr val="8B0000"/>
+                </a:solidFill>
+                <a:effectLst/>
+                <a:latin typeface="Consolas" panose="020B0609020204030204" pitchFamily="49" charset="0"/>
+              </a:rPr>
+              <a:t>$(</a:t>
+            </a:r>
+            <a:r>
+              <a:rPr lang="en-GB" sz="800" b="0" dirty="0" err="1">
+                <a:solidFill>
+                  <a:srgbClr val="8B0000"/>
+                </a:solidFill>
+                <a:effectLst/>
+                <a:latin typeface="Consolas" panose="020B0609020204030204" pitchFamily="49" charset="0"/>
+              </a:rPr>
+              <a:t>Build.SourcesDirectory</a:t>
+            </a:r>
+            <a:r>
+              <a:rPr lang="en-GB" sz="800" b="0" dirty="0">
+                <a:solidFill>
+                  <a:srgbClr val="8B0000"/>
+                </a:solidFill>
+                <a:effectLst/>
+                <a:latin typeface="Consolas" panose="020B0609020204030204" pitchFamily="49" charset="0"/>
+              </a:rPr>
+              <a:t>)/</a:t>
+            </a:r>
+            <a:r>
+              <a:rPr lang="en-GB" sz="800" b="0" dirty="0" err="1">
+                <a:solidFill>
+                  <a:srgbClr val="8B0000"/>
+                </a:solidFill>
+                <a:effectLst/>
+                <a:latin typeface="Consolas" panose="020B0609020204030204" pitchFamily="49" charset="0"/>
+              </a:rPr>
+              <a:t>src</a:t>
+            </a:r>
+            <a:r>
+              <a:rPr lang="en-GB" sz="800" b="0" dirty="0">
+                <a:solidFill>
+                  <a:srgbClr val="8B0000"/>
+                </a:solidFill>
+                <a:effectLst/>
+                <a:latin typeface="Consolas" panose="020B0609020204030204" pitchFamily="49" charset="0"/>
+              </a:rPr>
+              <a:t>-python/</a:t>
+            </a:r>
+            <a:r>
+              <a:rPr lang="en-GB" sz="800" b="0" dirty="0">
+                <a:solidFill>
+                  <a:srgbClr val="333333"/>
+                </a:solidFill>
+                <a:effectLst/>
+                <a:latin typeface="Consolas" panose="020B0609020204030204" pitchFamily="49" charset="0"/>
+              </a:rPr>
+              <a:t>  </a:t>
+            </a:r>
+          </a:p>
+          <a:p>
+            <a:r>
+              <a:rPr lang="en-GB" sz="800" b="0" dirty="0">
+                <a:solidFill>
+                  <a:srgbClr val="333333"/>
+                </a:solidFill>
+                <a:effectLst/>
+                <a:latin typeface="Consolas" panose="020B0609020204030204" pitchFamily="49" charset="0"/>
+              </a:rPr>
+              <a:t>    </a:t>
+            </a:r>
+            <a:r>
+              <a:rPr lang="en-GB" sz="800" b="0" dirty="0">
+                <a:solidFill>
+                  <a:srgbClr val="8B0000"/>
+                </a:solidFill>
+                <a:effectLst/>
+                <a:latin typeface="Consolas" panose="020B0609020204030204" pitchFamily="49" charset="0"/>
+              </a:rPr>
+              <a:t>artifact</a:t>
+            </a:r>
+            <a:r>
+              <a:rPr lang="en-GB" sz="800" b="0" dirty="0">
+                <a:solidFill>
+                  <a:srgbClr val="000000"/>
+                </a:solidFill>
+                <a:effectLst/>
+                <a:latin typeface="Consolas" panose="020B0609020204030204" pitchFamily="49" charset="0"/>
+              </a:rPr>
+              <a:t>:</a:t>
+            </a:r>
+            <a:r>
+              <a:rPr lang="en-GB" sz="800" b="0" dirty="0">
+                <a:solidFill>
+                  <a:srgbClr val="333333"/>
+                </a:solidFill>
+                <a:effectLst/>
+                <a:latin typeface="Consolas" panose="020B0609020204030204" pitchFamily="49" charset="0"/>
+              </a:rPr>
+              <a:t> </a:t>
+            </a:r>
+            <a:r>
+              <a:rPr lang="en-GB" sz="800" b="0" dirty="0">
+                <a:solidFill>
+                  <a:srgbClr val="000000"/>
+                </a:solidFill>
+                <a:effectLst/>
+                <a:latin typeface="Consolas" panose="020B0609020204030204" pitchFamily="49" charset="0"/>
+              </a:rPr>
+              <a:t>'</a:t>
+            </a:r>
+            <a:r>
+              <a:rPr lang="en-GB" sz="800" b="0" dirty="0" err="1">
+                <a:solidFill>
+                  <a:srgbClr val="8B0000"/>
+                </a:solidFill>
+                <a:effectLst/>
+                <a:latin typeface="Consolas" panose="020B0609020204030204" pitchFamily="49" charset="0"/>
+              </a:rPr>
+              <a:t>pythonsource</a:t>
+            </a:r>
+            <a:r>
+              <a:rPr lang="en-GB" sz="800" b="0" dirty="0">
+                <a:solidFill>
+                  <a:srgbClr val="000000"/>
+                </a:solidFill>
+                <a:effectLst/>
+                <a:latin typeface="Consolas" panose="020B0609020204030204" pitchFamily="49" charset="0"/>
+              </a:rPr>
+              <a:t>'</a:t>
+            </a:r>
+            <a:endParaRPr lang="en-GB" sz="800" b="0" dirty="0">
+              <a:solidFill>
+                <a:srgbClr val="333333"/>
+              </a:solidFill>
+              <a:effectLst/>
+              <a:latin typeface="Consolas" panose="020B0609020204030204" pitchFamily="49" charset="0"/>
+            </a:endParaRPr>
+          </a:p>
+          <a:p>
+            <a:br>
+              <a:rPr lang="en-GB" sz="800" b="0" dirty="0">
+                <a:solidFill>
+                  <a:srgbClr val="333333"/>
+                </a:solidFill>
+                <a:effectLst/>
+                <a:latin typeface="Consolas" panose="020B0609020204030204" pitchFamily="49" charset="0"/>
+              </a:rPr>
+            </a:br>
+            <a:endParaRPr lang="en-GB" sz="800" b="0" dirty="0">
+              <a:solidFill>
+                <a:srgbClr val="333333"/>
+              </a:solidFill>
+              <a:effectLst/>
+              <a:latin typeface="Consolas" panose="020B0609020204030204" pitchFamily="49" charset="0"/>
+            </a:endParaRPr>
+          </a:p>
+          <a:p>
+            <a:endParaRPr lang="en-GB" sz="800" dirty="0"/>
+          </a:p>
+        </p:txBody>
+      </p:sp>
+    </p:spTree>
+    <p:extLst>
+      <p:ext uri="{BB962C8B-B14F-4D97-AF65-F5344CB8AC3E}">
+        <p14:creationId xmlns:p14="http://schemas.microsoft.com/office/powerpoint/2010/main" val="2256406832"/>
       </p:ext>
     </p:extLst>
   </p:cSld>

</xml_diff>